<commit_message>
removed version number from intel-openmp and smoothed checking of particle size change
</commit_message>
<xml_diff>
--- a/PyCHAM/output/GMD_paper/Results/model_flow_diagram.pptx
+++ b/PyCHAM/output/GMD_paper/Results/model_flow_diagram.pptx
@@ -104,6 +104,11 @@
       </a:defRPr>
     </a:lvl9pPr>
   </p:defaultTextStyle>
+  <p:extLst>
+    <p:ext uri="{EFAFB233-063F-42B5-8137-9DF3F51BA10A}">
+      <p15:sldGuideLst xmlns:p15="http://schemas.microsoft.com/office/powerpoint/2012/main"/>
+    </p:ext>
+  </p:extLst>
 </p:presentation>
 </file>
 
@@ -238,7 +243,7 @@
           <a:p>
             <a:fld id="{CD0ADA31-5820-614A-9D16-8F4F9317ADA4}" type="datetimeFigureOut">
               <a:rPr lang="en-GB" smtClean="0"/>
-              <a:t>29/04/2020</a:t>
+              <a:t>09/06/2020</a:t>
             </a:fld>
             <a:endParaRPr lang="en-GB"/>
           </a:p>
@@ -408,7 +413,7 @@
           <a:p>
             <a:fld id="{CD0ADA31-5820-614A-9D16-8F4F9317ADA4}" type="datetimeFigureOut">
               <a:rPr lang="en-GB" smtClean="0"/>
-              <a:t>29/04/2020</a:t>
+              <a:t>09/06/2020</a:t>
             </a:fld>
             <a:endParaRPr lang="en-GB"/>
           </a:p>
@@ -588,7 +593,7 @@
           <a:p>
             <a:fld id="{CD0ADA31-5820-614A-9D16-8F4F9317ADA4}" type="datetimeFigureOut">
               <a:rPr lang="en-GB" smtClean="0"/>
-              <a:t>29/04/2020</a:t>
+              <a:t>09/06/2020</a:t>
             </a:fld>
             <a:endParaRPr lang="en-GB"/>
           </a:p>
@@ -758,7 +763,7 @@
           <a:p>
             <a:fld id="{CD0ADA31-5820-614A-9D16-8F4F9317ADA4}" type="datetimeFigureOut">
               <a:rPr lang="en-GB" smtClean="0"/>
-              <a:t>29/04/2020</a:t>
+              <a:t>09/06/2020</a:t>
             </a:fld>
             <a:endParaRPr lang="en-GB"/>
           </a:p>
@@ -1002,7 +1007,7 @@
           <a:p>
             <a:fld id="{CD0ADA31-5820-614A-9D16-8F4F9317ADA4}" type="datetimeFigureOut">
               <a:rPr lang="en-GB" smtClean="0"/>
-              <a:t>29/04/2020</a:t>
+              <a:t>09/06/2020</a:t>
             </a:fld>
             <a:endParaRPr lang="en-GB"/>
           </a:p>
@@ -1234,7 +1239,7 @@
           <a:p>
             <a:fld id="{CD0ADA31-5820-614A-9D16-8F4F9317ADA4}" type="datetimeFigureOut">
               <a:rPr lang="en-GB" smtClean="0"/>
-              <a:t>29/04/2020</a:t>
+              <a:t>09/06/2020</a:t>
             </a:fld>
             <a:endParaRPr lang="en-GB"/>
           </a:p>
@@ -1601,7 +1606,7 @@
           <a:p>
             <a:fld id="{CD0ADA31-5820-614A-9D16-8F4F9317ADA4}" type="datetimeFigureOut">
               <a:rPr lang="en-GB" smtClean="0"/>
-              <a:t>29/04/2020</a:t>
+              <a:t>09/06/2020</a:t>
             </a:fld>
             <a:endParaRPr lang="en-GB"/>
           </a:p>
@@ -1719,7 +1724,7 @@
           <a:p>
             <a:fld id="{CD0ADA31-5820-614A-9D16-8F4F9317ADA4}" type="datetimeFigureOut">
               <a:rPr lang="en-GB" smtClean="0"/>
-              <a:t>29/04/2020</a:t>
+              <a:t>09/06/2020</a:t>
             </a:fld>
             <a:endParaRPr lang="en-GB"/>
           </a:p>
@@ -1814,7 +1819,7 @@
           <a:p>
             <a:fld id="{CD0ADA31-5820-614A-9D16-8F4F9317ADA4}" type="datetimeFigureOut">
               <a:rPr lang="en-GB" smtClean="0"/>
-              <a:t>29/04/2020</a:t>
+              <a:t>09/06/2020</a:t>
             </a:fld>
             <a:endParaRPr lang="en-GB"/>
           </a:p>
@@ -2091,7 +2096,7 @@
           <a:p>
             <a:fld id="{CD0ADA31-5820-614A-9D16-8F4F9317ADA4}" type="datetimeFigureOut">
               <a:rPr lang="en-GB" smtClean="0"/>
-              <a:t>29/04/2020</a:t>
+              <a:t>09/06/2020</a:t>
             </a:fld>
             <a:endParaRPr lang="en-GB"/>
           </a:p>
@@ -2348,7 +2353,7 @@
           <a:p>
             <a:fld id="{CD0ADA31-5820-614A-9D16-8F4F9317ADA4}" type="datetimeFigureOut">
               <a:rPr lang="en-GB" smtClean="0"/>
-              <a:t>29/04/2020</a:t>
+              <a:t>09/06/2020</a:t>
             </a:fld>
             <a:endParaRPr lang="en-GB"/>
           </a:p>
@@ -2561,7 +2566,7 @@
           <a:p>
             <a:fld id="{CD0ADA31-5820-614A-9D16-8F4F9317ADA4}" type="datetimeFigureOut">
               <a:rPr lang="en-GB" smtClean="0"/>
-              <a:t>29/04/2020</a:t>
+              <a:t>09/06/2020</a:t>
             </a:fld>
             <a:endParaRPr lang="en-GB"/>
           </a:p>
@@ -2978,6 +2983,156 @@
       </p:grpSpPr>
       <p:sp>
         <p:nvSpPr>
+          <p:cNvPr id="53" name="TextBox 52">
+            <a:extLst>
+              <a:ext uri="{FF2B5EF4-FFF2-40B4-BE49-F238E27FC236}">
+                <a16:creationId xmlns:a16="http://schemas.microsoft.com/office/drawing/2014/main" id="{922AF99E-1C1C-7F47-ABC7-BD2116A7C209}"/>
+              </a:ext>
+            </a:extLst>
+          </p:cNvPr>
+          <p:cNvSpPr txBox="1"/>
+          <p:nvPr/>
+        </p:nvSpPr>
+        <p:spPr>
+          <a:xfrm rot="5400000">
+            <a:off x="5197851" y="4702566"/>
+            <a:ext cx="1674374" cy="738664"/>
+          </a:xfrm>
+          <a:prstGeom prst="rect">
+            <a:avLst/>
+          </a:prstGeom>
+          <a:solidFill>
+            <a:srgbClr val="E3AEE7"/>
+          </a:solidFill>
+        </p:spPr>
+        <p:txBody>
+          <a:bodyPr wrap="square" rtlCol="0">
+            <a:spAutoFit/>
+          </a:bodyPr>
+          <a:lstStyle/>
+          <a:p>
+            <a:pPr algn="ctr"/>
+            <a:r>
+              <a:rPr lang="en-GB" sz="1400" dirty="0">
+                <a:latin typeface="Corbel" panose="020B0503020204020204" pitchFamily="34" charset="0"/>
+              </a:rPr>
+              <a:t>particle number processes time interval  reached</a:t>
+            </a:r>
+          </a:p>
+        </p:txBody>
+      </p:sp>
+      <p:sp>
+        <p:nvSpPr>
+          <p:cNvPr id="91" name="Rectangle 90">
+            <a:extLst>
+              <a:ext uri="{FF2B5EF4-FFF2-40B4-BE49-F238E27FC236}">
+                <a16:creationId xmlns:a16="http://schemas.microsoft.com/office/drawing/2014/main" id="{E53AF47B-76D3-204C-ACAE-DFFD1CC5B600}"/>
+              </a:ext>
+            </a:extLst>
+          </p:cNvPr>
+          <p:cNvSpPr/>
+          <p:nvPr/>
+        </p:nvSpPr>
+        <p:spPr>
+          <a:xfrm>
+            <a:off x="7082593" y="1089872"/>
+            <a:ext cx="1909006" cy="226539"/>
+          </a:xfrm>
+          <a:prstGeom prst="rect">
+            <a:avLst/>
+          </a:prstGeom>
+          <a:solidFill>
+            <a:srgbClr val="E3AEE7">
+              <a:alpha val="41961"/>
+            </a:srgbClr>
+          </a:solidFill>
+          <a:ln>
+            <a:noFill/>
+          </a:ln>
+        </p:spPr>
+        <p:style>
+          <a:lnRef idx="2">
+            <a:schemeClr val="accent1">
+              <a:shade val="50000"/>
+            </a:schemeClr>
+          </a:lnRef>
+          <a:fillRef idx="1">
+            <a:schemeClr val="accent1"/>
+          </a:fillRef>
+          <a:effectRef idx="0">
+            <a:schemeClr val="accent1"/>
+          </a:effectRef>
+          <a:fontRef idx="minor">
+            <a:schemeClr val="lt1"/>
+          </a:fontRef>
+        </p:style>
+        <p:txBody>
+          <a:bodyPr rtlCol="0" anchor="ctr"/>
+          <a:lstStyle/>
+          <a:p>
+            <a:pPr algn="ctr"/>
+            <a:endParaRPr lang="en-GB">
+              <a:latin typeface="Corbel" panose="020B0503020204020204" pitchFamily="34" charset="0"/>
+            </a:endParaRPr>
+          </a:p>
+        </p:txBody>
+      </p:sp>
+      <p:sp>
+        <p:nvSpPr>
+          <p:cNvPr id="90" name="Rectangle 89">
+            <a:extLst>
+              <a:ext uri="{FF2B5EF4-FFF2-40B4-BE49-F238E27FC236}">
+                <a16:creationId xmlns:a16="http://schemas.microsoft.com/office/drawing/2014/main" id="{040B6DE6-32F6-3E4C-977B-A88A46B0FE41}"/>
+              </a:ext>
+            </a:extLst>
+          </p:cNvPr>
+          <p:cNvSpPr/>
+          <p:nvPr/>
+        </p:nvSpPr>
+        <p:spPr>
+          <a:xfrm>
+            <a:off x="7437769" y="889346"/>
+            <a:ext cx="1556084" cy="203765"/>
+          </a:xfrm>
+          <a:prstGeom prst="rect">
+            <a:avLst/>
+          </a:prstGeom>
+          <a:solidFill>
+            <a:srgbClr val="B7ED7D"/>
+          </a:solidFill>
+          <a:ln>
+            <a:noFill/>
+          </a:ln>
+        </p:spPr>
+        <p:style>
+          <a:lnRef idx="2">
+            <a:schemeClr val="accent1">
+              <a:shade val="50000"/>
+            </a:schemeClr>
+          </a:lnRef>
+          <a:fillRef idx="1">
+            <a:schemeClr val="accent1"/>
+          </a:fillRef>
+          <a:effectRef idx="0">
+            <a:schemeClr val="accent1"/>
+          </a:effectRef>
+          <a:fontRef idx="minor">
+            <a:schemeClr val="lt1"/>
+          </a:fontRef>
+        </p:style>
+        <p:txBody>
+          <a:bodyPr rtlCol="0" anchor="ctr"/>
+          <a:lstStyle/>
+          <a:p>
+            <a:pPr algn="ctr"/>
+            <a:endParaRPr lang="en-GB">
+              <a:latin typeface="Corbel" panose="020B0503020204020204" pitchFamily="34" charset="0"/>
+            </a:endParaRPr>
+          </a:p>
+        </p:txBody>
+      </p:sp>
+      <p:sp>
+        <p:nvSpPr>
           <p:cNvPr id="4" name="TextBox 3">
             <a:extLst>
               <a:ext uri="{FF2B5EF4-FFF2-40B4-BE49-F238E27FC236}">
@@ -3010,8 +3165,10 @@
           <a:lstStyle/>
           <a:p>
             <a:r>
-              <a:rPr lang="en-GB" sz="1400" dirty="0"/>
-              <a:t>File containing Model Variables opened</a:t>
+              <a:rPr lang="en-GB" sz="1400" dirty="0">
+                <a:latin typeface="Corbel" panose="020B0503020204020204" pitchFamily="34" charset="0"/>
+              </a:rPr>
+              <a:t>File containing model variables opened</a:t>
             </a:r>
           </a:p>
         </p:txBody>
@@ -3031,7 +3188,7 @@
         <p:spPr>
           <a:xfrm>
             <a:off x="2317952" y="2346506"/>
-            <a:ext cx="711541" cy="307777"/>
+            <a:ext cx="739305" cy="307777"/>
           </a:xfrm>
           <a:prstGeom prst="rect">
             <a:avLst/>
@@ -3050,7 +3207,9 @@
           <a:lstStyle/>
           <a:p>
             <a:r>
-              <a:rPr lang="en-GB" sz="1400" dirty="0"/>
+              <a:rPr lang="en-GB" sz="1400" dirty="0">
+                <a:latin typeface="Corbel" panose="020B0503020204020204" pitchFamily="34" charset="0"/>
+              </a:rPr>
               <a:t>Parsing</a:t>
             </a:r>
           </a:p>
@@ -3090,13 +3249,17 @@
           <a:lstStyle/>
           <a:p>
             <a:r>
-              <a:rPr lang="en-GB" sz="1400" dirty="0"/>
+              <a:rPr lang="en-GB" sz="1400" dirty="0">
+                <a:latin typeface="Corbel" panose="020B0503020204020204" pitchFamily="34" charset="0"/>
+              </a:rPr>
               <a:t>Component </a:t>
             </a:r>
           </a:p>
           <a:p>
             <a:r>
-              <a:rPr lang="en-GB" sz="1400" dirty="0"/>
+              <a:rPr lang="en-GB" sz="1400" dirty="0">
+                <a:latin typeface="Corbel" panose="020B0503020204020204" pitchFamily="34" charset="0"/>
+              </a:rPr>
               <a:t>properties set</a:t>
             </a:r>
           </a:p>
@@ -3117,7 +3280,7 @@
         <p:spPr>
           <a:xfrm>
             <a:off x="4336279" y="2366584"/>
-            <a:ext cx="2210605" cy="307777"/>
+            <a:ext cx="2292615" cy="307777"/>
           </a:xfrm>
           <a:prstGeom prst="rect">
             <a:avLst/>
@@ -3129,9 +3292,7 @@
             </a:schemeClr>
           </a:solidFill>
           <a:ln w="28575">
-            <a:solidFill>
-              <a:srgbClr val="7030A0"/>
-            </a:solidFill>
+            <a:noFill/>
           </a:ln>
         </p:spPr>
         <p:txBody>
@@ -3141,8 +3302,10 @@
           <a:lstStyle/>
           <a:p>
             <a:r>
-              <a:rPr lang="en-GB" sz="1400" dirty="0"/>
-              <a:t>Update chamber conditions</a:t>
+              <a:rPr lang="en-GB" sz="1400" dirty="0">
+                <a:latin typeface="Corbel" panose="020B0503020204020204" pitchFamily="34" charset="0"/>
+              </a:rPr>
+              <a:t>Update boundary conditions</a:t>
             </a:r>
           </a:p>
         </p:txBody>
@@ -3161,8 +3324,8 @@
         </p:nvSpPr>
         <p:spPr>
           <a:xfrm>
-            <a:off x="4336996" y="3397864"/>
-            <a:ext cx="2209887" cy="954107"/>
+            <a:off x="4336996" y="2804310"/>
+            <a:ext cx="2209887" cy="1384995"/>
           </a:xfrm>
           <a:prstGeom prst="rect">
             <a:avLst/>
@@ -3174,12 +3337,7 @@
             </a:schemeClr>
           </a:solidFill>
           <a:ln w="28575">
-            <a:solidFill>
-              <a:schemeClr val="accent6">
-                <a:lumMod val="60000"/>
-                <a:lumOff val="40000"/>
-              </a:schemeClr>
-            </a:solidFill>
+            <a:noFill/>
           </a:ln>
         </p:spPr>
         <p:txBody>
@@ -3189,26 +3347,50 @@
           <a:lstStyle/>
           <a:p>
             <a:r>
-              <a:rPr lang="en-GB" sz="1400" dirty="0"/>
+              <a:rPr lang="en-GB" sz="1400" dirty="0">
+                <a:latin typeface="Corbel" panose="020B0503020204020204" pitchFamily="34" charset="0"/>
+              </a:rPr>
               <a:t>Integration of:</a:t>
             </a:r>
           </a:p>
           <a:p>
             <a:r>
-              <a:rPr lang="en-GB" sz="1400" dirty="0"/>
+              <a:rPr lang="en-GB" sz="1400" dirty="0">
+                <a:latin typeface="Corbel" panose="020B0503020204020204" pitchFamily="34" charset="0"/>
+              </a:rPr>
               <a:t>Gas-phase photochemistry</a:t>
             </a:r>
           </a:p>
           <a:p>
             <a:r>
-              <a:rPr lang="en-GB" sz="1400" dirty="0"/>
+              <a:rPr lang="en-GB" sz="1400" dirty="0">
+                <a:latin typeface="Corbel" panose="020B0503020204020204" pitchFamily="34" charset="0"/>
+              </a:rPr>
               <a:t>Gas-particle partitioning</a:t>
             </a:r>
           </a:p>
           <a:p>
             <a:r>
-              <a:rPr lang="en-GB" sz="1400" dirty="0"/>
+              <a:rPr lang="en-GB" sz="1400" dirty="0">
+                <a:latin typeface="Corbel" panose="020B0503020204020204" pitchFamily="34" charset="0"/>
+              </a:rPr>
               <a:t>Gas-wall partitioning</a:t>
+            </a:r>
+          </a:p>
+          <a:p>
+            <a:r>
+              <a:rPr lang="en-GB" sz="1400" dirty="0">
+                <a:latin typeface="Corbel" panose="020B0503020204020204" pitchFamily="34" charset="0"/>
+              </a:rPr>
+              <a:t>Followed by:</a:t>
+            </a:r>
+          </a:p>
+          <a:p>
+            <a:r>
+              <a:rPr lang="en-GB" sz="1400" dirty="0">
+                <a:latin typeface="Corbel" panose="020B0503020204020204" pitchFamily="34" charset="0"/>
+              </a:rPr>
+              <a:t>Moving-centre structure</a:t>
             </a:r>
           </a:p>
         </p:txBody>
@@ -3227,8 +3409,8 @@
         </p:nvSpPr>
         <p:spPr>
           <a:xfrm>
-            <a:off x="4336958" y="4544769"/>
-            <a:ext cx="2220558" cy="954107"/>
+            <a:off x="4077200" y="4677909"/>
+            <a:ext cx="1650358" cy="954107"/>
           </a:xfrm>
           <a:prstGeom prst="rect">
             <a:avLst/>
@@ -3240,9 +3422,7 @@
             </a:schemeClr>
           </a:solidFill>
           <a:ln w="28575">
-            <a:solidFill>
-              <a:srgbClr val="7030A0"/>
-            </a:solidFill>
+            <a:noFill/>
           </a:ln>
         </p:spPr>
         <p:txBody>
@@ -3252,25 +3432,25 @@
           <a:lstStyle/>
           <a:p>
             <a:r>
-              <a:rPr lang="en-GB" sz="1400" dirty="0"/>
-              <a:t>Moving-centre structure</a:t>
-            </a:r>
-          </a:p>
-          <a:p>
-            <a:r>
-              <a:rPr lang="en-GB" sz="1400" dirty="0"/>
+              <a:rPr lang="en-GB" sz="1400" dirty="0">
+                <a:latin typeface="Corbel" panose="020B0503020204020204" pitchFamily="34" charset="0"/>
+              </a:rPr>
               <a:t>Coagulation</a:t>
             </a:r>
           </a:p>
           <a:p>
             <a:r>
-              <a:rPr lang="en-GB" sz="1400" dirty="0"/>
+              <a:rPr lang="en-GB" sz="1400" dirty="0">
+                <a:latin typeface="Corbel" panose="020B0503020204020204" pitchFamily="34" charset="0"/>
+              </a:rPr>
               <a:t>Particle loss to walls</a:t>
             </a:r>
           </a:p>
           <a:p>
             <a:r>
-              <a:rPr lang="en-GB" sz="1400" dirty="0"/>
+              <a:rPr lang="en-GB" sz="1400" dirty="0">
+                <a:latin typeface="Corbel" panose="020B0503020204020204" pitchFamily="34" charset="0"/>
+              </a:rPr>
               <a:t>Nucleation</a:t>
             </a:r>
           </a:p>
@@ -3291,7 +3471,7 @@
         <p:spPr>
           <a:xfrm>
             <a:off x="2335017" y="4916185"/>
-            <a:ext cx="1165897" cy="307777"/>
+            <a:ext cx="1183016" cy="307777"/>
           </a:xfrm>
           <a:prstGeom prst="rect">
             <a:avLst/>
@@ -3310,7 +3490,9 @@
           <a:lstStyle/>
           <a:p>
             <a:r>
-              <a:rPr lang="en-GB" sz="1400" dirty="0"/>
+              <a:rPr lang="en-GB" sz="1400" dirty="0">
+                <a:latin typeface="Corbel" panose="020B0503020204020204" pitchFamily="34" charset="0"/>
+              </a:rPr>
               <a:t>Results saved</a:t>
             </a:r>
           </a:p>
@@ -3350,7 +3532,9 @@
           <a:lstStyle/>
           <a:p>
             <a:r>
-              <a:rPr lang="en-GB" sz="1400" dirty="0"/>
+              <a:rPr lang="en-GB" sz="1400" dirty="0">
+                <a:latin typeface="Corbel" panose="020B0503020204020204" pitchFamily="34" charset="0"/>
+              </a:rPr>
               <a:t>Model Variables .txt File</a:t>
             </a:r>
           </a:p>
@@ -3373,7 +3557,7 @@
         <p:spPr>
           <a:xfrm>
             <a:off x="2213339" y="160114"/>
-            <a:ext cx="0" cy="6200860"/>
+            <a:ext cx="0" cy="6245562"/>
           </a:xfrm>
           <a:prstGeom prst="line">
             <a:avLst/>
@@ -3429,7 +3613,9 @@
           <a:p>
             <a:pPr algn="ctr"/>
             <a:r>
-              <a:rPr lang="en-GB" sz="1600" b="1" dirty="0"/>
+              <a:rPr lang="en-GB" sz="1600" b="1" dirty="0">
+                <a:latin typeface="Corbel" panose="020B0503020204020204" pitchFamily="34" charset="0"/>
+              </a:rPr>
               <a:t>Software Action</a:t>
             </a:r>
           </a:p>
@@ -3465,7 +3651,9 @@
           <a:p>
             <a:pPr algn="ctr"/>
             <a:r>
-              <a:rPr lang="en-GB" sz="1600" b="1" dirty="0"/>
+              <a:rPr lang="en-GB" sz="1600" b="1" dirty="0">
+                <a:latin typeface="Corbel" panose="020B0503020204020204" pitchFamily="34" charset="0"/>
+              </a:rPr>
               <a:t>GUI Button</a:t>
             </a:r>
           </a:p>
@@ -3487,8 +3675,8 @@
         </p:nvCxnSpPr>
         <p:spPr>
           <a:xfrm>
-            <a:off x="40105" y="547597"/>
-            <a:ext cx="8975558" cy="0"/>
+            <a:off x="0" y="547597"/>
+            <a:ext cx="9160041" cy="0"/>
           </a:xfrm>
           <a:prstGeom prst="line">
             <a:avLst/>
@@ -3528,8 +3716,8 @@
         </p:nvSpPr>
         <p:spPr>
           <a:xfrm>
-            <a:off x="2332717" y="5962245"/>
-            <a:ext cx="2416367" cy="307777"/>
+            <a:off x="2332717" y="6090581"/>
+            <a:ext cx="2457724" cy="307777"/>
           </a:xfrm>
           <a:prstGeom prst="rect">
             <a:avLst/>
@@ -3548,7 +3736,9 @@
           <a:lstStyle/>
           <a:p>
             <a:r>
-              <a:rPr lang="en-GB" sz="1400" dirty="0"/>
+              <a:rPr lang="en-GB" sz="1400" dirty="0">
+                <a:latin typeface="Corbel" panose="020B0503020204020204" pitchFamily="34" charset="0"/>
+              </a:rPr>
               <a:t>Standard result plot generated</a:t>
             </a:r>
           </a:p>
@@ -3568,8 +3758,8 @@
         </p:nvSpPr>
         <p:spPr>
           <a:xfrm>
-            <a:off x="40105" y="5969563"/>
-            <a:ext cx="1037528" cy="307777"/>
+            <a:off x="40105" y="6080314"/>
+            <a:ext cx="1056379" cy="307777"/>
           </a:xfrm>
           <a:prstGeom prst="rect">
             <a:avLst/>
@@ -3588,7 +3778,9 @@
           <a:lstStyle/>
           <a:p>
             <a:r>
-              <a:rPr lang="en-GB" sz="1400" dirty="0"/>
+              <a:rPr lang="en-GB" sz="1400" dirty="0">
+                <a:latin typeface="Corbel" panose="020B0503020204020204" pitchFamily="34" charset="0"/>
+              </a:rPr>
               <a:t>Plot Results</a:t>
             </a:r>
           </a:p>
@@ -3609,7 +3801,7 @@
         <p:spPr>
           <a:xfrm>
             <a:off x="40105" y="2322671"/>
-            <a:ext cx="1628331" cy="307777"/>
+            <a:ext cx="981935" cy="307777"/>
           </a:xfrm>
           <a:prstGeom prst="rect">
             <a:avLst/>
@@ -3628,8 +3820,10 @@
           <a:lstStyle/>
           <a:p>
             <a:r>
-              <a:rPr lang="en-GB" sz="1400" dirty="0"/>
-              <a:t>Start the simulation</a:t>
+              <a:rPr lang="en-GB" sz="1400" dirty="0">
+                <a:latin typeface="Corbel" panose="020B0503020204020204" pitchFamily="34" charset="0"/>
+              </a:rPr>
+              <a:t>Run Model</a:t>
             </a:r>
           </a:p>
         </p:txBody>
@@ -3649,7 +3843,7 @@
         <p:spPr>
           <a:xfrm>
             <a:off x="2316266" y="613653"/>
-            <a:ext cx="3130601" cy="307777"/>
+            <a:ext cx="3175869" cy="307777"/>
           </a:xfrm>
           <a:prstGeom prst="rect">
             <a:avLst/>
@@ -3668,7 +3862,9 @@
           <a:lstStyle/>
           <a:p>
             <a:r>
-              <a:rPr lang="en-GB" sz="1400" dirty="0"/>
+              <a:rPr lang="en-GB" sz="1400" dirty="0">
+                <a:latin typeface="Corbel" panose="020B0503020204020204" pitchFamily="34" charset="0"/>
+              </a:rPr>
               <a:t>File containing chemical scheme opened</a:t>
             </a:r>
           </a:p>
@@ -3689,7 +3885,7 @@
         <p:spPr>
           <a:xfrm>
             <a:off x="40105" y="613653"/>
-            <a:ext cx="2042547" cy="307777"/>
+            <a:ext cx="2097497" cy="307777"/>
           </a:xfrm>
           <a:prstGeom prst="rect">
             <a:avLst/>
@@ -3708,7 +3904,9 @@
           <a:lstStyle/>
           <a:p>
             <a:r>
-              <a:rPr lang="en-GB" sz="1400" dirty="0"/>
+              <a:rPr lang="en-GB" sz="1400" dirty="0">
+                <a:latin typeface="Corbel" panose="020B0503020204020204" pitchFamily="34" charset="0"/>
+              </a:rPr>
               <a:t>Chemical Scheme .txt File</a:t>
             </a:r>
           </a:p>
@@ -3729,7 +3927,7 @@
         <p:spPr>
           <a:xfrm>
             <a:off x="41442" y="971307"/>
-            <a:ext cx="2108398" cy="307777"/>
+            <a:ext cx="2163221" cy="307777"/>
           </a:xfrm>
           <a:prstGeom prst="rect">
             <a:avLst/>
@@ -3748,7 +3946,9 @@
           <a:lstStyle/>
           <a:p>
             <a:r>
-              <a:rPr lang="en-GB" sz="1400" dirty="0"/>
+              <a:rPr lang="en-GB" sz="1400" dirty="0">
+                <a:latin typeface="Corbel" panose="020B0503020204020204" pitchFamily="34" charset="0"/>
+              </a:rPr>
               <a:t>Chemical Scheme .xml File</a:t>
             </a:r>
           </a:p>
@@ -3769,7 +3969,7 @@
         <p:spPr>
           <a:xfrm>
             <a:off x="2313771" y="972469"/>
-            <a:ext cx="4260975" cy="307777"/>
+            <a:ext cx="3704669" cy="307777"/>
           </a:xfrm>
           <a:prstGeom prst="rect">
             <a:avLst/>
@@ -3788,8 +3988,10 @@
           <a:lstStyle/>
           <a:p>
             <a:r>
-              <a:rPr lang="en-GB" sz="1400" dirty="0"/>
-              <a:t>File containing component identifier conversion opened</a:t>
+              <a:rPr lang="en-GB" sz="1400" dirty="0">
+                <a:latin typeface="Corbel" panose="020B0503020204020204" pitchFamily="34" charset="0"/>
+              </a:rPr>
+              <a:t>File for component identifier conversion opened</a:t>
             </a:r>
           </a:p>
         </p:txBody>
@@ -3808,8 +4010,8 @@
         </p:nvSpPr>
         <p:spPr>
           <a:xfrm>
-            <a:off x="6677502" y="192639"/>
-            <a:ext cx="2471738" cy="338554"/>
+            <a:off x="6607162" y="192639"/>
+            <a:ext cx="2591222" cy="338554"/>
           </a:xfrm>
           <a:prstGeom prst="rect">
             <a:avLst/>
@@ -3824,7 +4026,9 @@
           <a:p>
             <a:pPr algn="ctr"/>
             <a:r>
-              <a:rPr lang="en-GB" sz="1600" b="1" dirty="0"/>
+              <a:rPr lang="en-GB" sz="1600" b="1" dirty="0">
+                <a:latin typeface="Corbel" panose="020B0503020204020204" pitchFamily="34" charset="0"/>
+              </a:rPr>
               <a:t>Temporal Resolution Notes</a:t>
             </a:r>
           </a:p>
@@ -3847,7 +4051,7 @@
         <p:spPr>
           <a:xfrm>
             <a:off x="6657431" y="147240"/>
-            <a:ext cx="18381" cy="6213734"/>
+            <a:ext cx="7578" cy="6258436"/>
           </a:xfrm>
           <a:prstGeom prst="line">
             <a:avLst/>
@@ -3889,8 +4093,8 @@
         </p:nvCxnSpPr>
         <p:spPr>
           <a:xfrm>
-            <a:off x="40105" y="2206201"/>
-            <a:ext cx="8935452" cy="0"/>
+            <a:off x="0" y="2252866"/>
+            <a:ext cx="9198384" cy="0"/>
           </a:xfrm>
           <a:prstGeom prst="line">
             <a:avLst/>
@@ -3933,8 +4137,8 @@
         </p:nvCxnSpPr>
         <p:spPr>
           <a:xfrm>
-            <a:off x="40105" y="5798976"/>
-            <a:ext cx="8975558" cy="0"/>
+            <a:off x="-298938" y="5971764"/>
+            <a:ext cx="9458979" cy="0"/>
           </a:xfrm>
           <a:prstGeom prst="line">
             <a:avLst/>
@@ -3978,8 +4182,8 @@
         </p:nvCxnSpPr>
         <p:spPr>
           <a:xfrm>
-            <a:off x="2671277" y="1632628"/>
-            <a:ext cx="2446" cy="713878"/>
+            <a:off x="2687605" y="1643081"/>
+            <a:ext cx="0" cy="703425"/>
           </a:xfrm>
           <a:prstGeom prst="line">
             <a:avLst/>
@@ -4067,104 +4271,13 @@
           <p:nvPr/>
         </p:nvCxnSpPr>
         <p:spPr>
-          <a:xfrm rot="16200000" flipH="1">
-            <a:off x="3611154" y="2707916"/>
-            <a:ext cx="985308" cy="306350"/>
+          <a:xfrm>
+            <a:off x="4094390" y="2305970"/>
+            <a:ext cx="2500619" cy="1298203"/>
           </a:xfrm>
           <a:prstGeom prst="bentConnector3">
             <a:avLst>
-              <a:gd name="adj1" fmla="val -1726"/>
-            </a:avLst>
-          </a:prstGeom>
-          <a:ln w="28575">
-            <a:solidFill>
-              <a:schemeClr val="tx1"/>
-            </a:solidFill>
-            <a:tailEnd type="triangle"/>
-          </a:ln>
-        </p:spPr>
-        <p:style>
-          <a:lnRef idx="1">
-            <a:schemeClr val="accent1"/>
-          </a:lnRef>
-          <a:fillRef idx="0">
-            <a:schemeClr val="accent1"/>
-          </a:fillRef>
-          <a:effectRef idx="0">
-            <a:schemeClr val="accent1"/>
-          </a:effectRef>
-          <a:fontRef idx="minor">
-            <a:schemeClr val="tx1"/>
-          </a:fontRef>
-        </p:style>
-      </p:cxnSp>
-      <p:cxnSp>
-        <p:nvCxnSpPr>
-          <p:cNvPr id="46" name="Straight Connector 45">
-            <a:extLst>
-              <a:ext uri="{FF2B5EF4-FFF2-40B4-BE49-F238E27FC236}">
-                <a16:creationId xmlns:a16="http://schemas.microsoft.com/office/drawing/2014/main" id="{77D601FD-4F07-9840-8206-F06C5BE5F1D7}"/>
-              </a:ext>
-            </a:extLst>
-          </p:cNvPr>
-          <p:cNvCxnSpPr>
-            <a:cxnSpLocks/>
-          </p:cNvCxnSpPr>
-          <p:nvPr/>
-        </p:nvCxnSpPr>
-        <p:spPr>
-          <a:xfrm>
-            <a:off x="4267790" y="4107722"/>
-            <a:ext cx="5632" cy="674781"/>
-          </a:xfrm>
-          <a:prstGeom prst="line">
-            <a:avLst/>
-          </a:prstGeom>
-          <a:ln w="28575">
-            <a:solidFill>
-              <a:schemeClr val="tx1"/>
-            </a:solidFill>
-            <a:headEnd type="none" w="med" len="med"/>
-            <a:tailEnd type="triangle" w="med" len="med"/>
-          </a:ln>
-        </p:spPr>
-        <p:style>
-          <a:lnRef idx="1">
-            <a:schemeClr val="accent1"/>
-          </a:lnRef>
-          <a:fillRef idx="0">
-            <a:schemeClr val="accent1"/>
-          </a:fillRef>
-          <a:effectRef idx="0">
-            <a:schemeClr val="accent1"/>
-          </a:effectRef>
-          <a:fontRef idx="minor">
-            <a:schemeClr val="tx1"/>
-          </a:fontRef>
-        </p:style>
-      </p:cxnSp>
-      <p:cxnSp>
-        <p:nvCxnSpPr>
-          <p:cNvPr id="47" name="Elbow Connector 46">
-            <a:extLst>
-              <a:ext uri="{FF2B5EF4-FFF2-40B4-BE49-F238E27FC236}">
-                <a16:creationId xmlns:a16="http://schemas.microsoft.com/office/drawing/2014/main" id="{C2BA14E6-07B6-594C-8821-0F13B761744F}"/>
-              </a:ext>
-            </a:extLst>
-          </p:cNvPr>
-          <p:cNvCxnSpPr>
-            <a:cxnSpLocks/>
-          </p:cNvCxnSpPr>
-          <p:nvPr/>
-        </p:nvCxnSpPr>
-        <p:spPr>
-          <a:xfrm rot="16200000" flipV="1">
-            <a:off x="2522433" y="3777212"/>
-            <a:ext cx="3195233" cy="333824"/>
-          </a:xfrm>
-          <a:prstGeom prst="bentConnector3">
-            <a:avLst>
-              <a:gd name="adj1" fmla="val 271"/>
+              <a:gd name="adj1" fmla="val 100039"/>
             </a:avLst>
           </a:prstGeom>
           <a:ln w="28575">
@@ -4207,7 +4320,7 @@
         <p:spPr>
           <a:xfrm>
             <a:off x="3521486" y="3213439"/>
-            <a:ext cx="419725" cy="0"/>
+            <a:ext cx="283071" cy="0"/>
           </a:xfrm>
           <a:prstGeom prst="line">
             <a:avLst/>
@@ -4261,6 +4374,7 @@
             <a:solidFill>
               <a:schemeClr val="tx1"/>
             </a:solidFill>
+            <a:prstDash val="sysDot"/>
             <a:headEnd type="none" w="med" len="med"/>
             <a:tailEnd type="triangle" w="med" len="med"/>
           </a:ln>
@@ -4294,13 +4408,15 @@
         </p:nvSpPr>
         <p:spPr>
           <a:xfrm rot="16200000">
-            <a:off x="2566280" y="3804812"/>
-            <a:ext cx="3051774" cy="307777"/>
+            <a:off x="3282921" y="3035882"/>
+            <a:ext cx="1685760" cy="523220"/>
           </a:xfrm>
           <a:prstGeom prst="rect">
             <a:avLst/>
           </a:prstGeom>
-          <a:noFill/>
+          <a:solidFill>
+            <a:srgbClr val="B7ED7D"/>
+          </a:solidFill>
         </p:spPr>
         <p:txBody>
           <a:bodyPr wrap="square" rtlCol="0">
@@ -4308,162 +4424,12 @@
           </a:bodyPr>
           <a:lstStyle/>
           <a:p>
-            <a:r>
-              <a:rPr lang="en-GB" sz="1400" dirty="0"/>
-              <a:t>loop through user-defined time interval</a:t>
-            </a:r>
-          </a:p>
-        </p:txBody>
-      </p:sp>
-      <p:sp>
-        <p:nvSpPr>
-          <p:cNvPr id="59" name="TextBox 58">
-            <a:extLst>
-              <a:ext uri="{FF2B5EF4-FFF2-40B4-BE49-F238E27FC236}">
-                <a16:creationId xmlns:a16="http://schemas.microsoft.com/office/drawing/2014/main" id="{58199F36-E827-244B-B1E5-F10FDC42A9BE}"/>
-              </a:ext>
-            </a:extLst>
-          </p:cNvPr>
-          <p:cNvSpPr txBox="1"/>
-          <p:nvPr/>
-        </p:nvSpPr>
-        <p:spPr>
-          <a:xfrm>
-            <a:off x="6657431" y="613653"/>
-            <a:ext cx="2402913" cy="307777"/>
-          </a:xfrm>
-          <a:prstGeom prst="rect">
-            <a:avLst/>
-          </a:prstGeom>
-          <a:noFill/>
-        </p:spPr>
-        <p:txBody>
-          <a:bodyPr wrap="square" rtlCol="0">
-            <a:spAutoFit/>
-          </a:bodyPr>
-          <a:lstStyle/>
-          <a:p>
-            <a:r>
-              <a:rPr lang="en-GB" sz="1400" dirty="0"/>
-              <a:t>user sets the</a:t>
-            </a:r>
-          </a:p>
-        </p:txBody>
-      </p:sp>
-      <p:sp>
-        <p:nvSpPr>
-          <p:cNvPr id="60" name="TextBox 59">
-            <a:extLst>
-              <a:ext uri="{FF2B5EF4-FFF2-40B4-BE49-F238E27FC236}">
-                <a16:creationId xmlns:a16="http://schemas.microsoft.com/office/drawing/2014/main" id="{C8CC7A29-4E67-654B-BCF4-1A00FAEA7F4A}"/>
-              </a:ext>
-            </a:extLst>
-          </p:cNvPr>
-          <p:cNvSpPr txBox="1"/>
-          <p:nvPr/>
-        </p:nvSpPr>
-        <p:spPr>
-          <a:xfrm>
-            <a:off x="6755827" y="880482"/>
-            <a:ext cx="1983492" cy="307777"/>
-          </a:xfrm>
-          <a:prstGeom prst="rect">
-            <a:avLst/>
-          </a:prstGeom>
-          <a:noFill/>
-          <a:ln w="28575">
-            <a:solidFill>
-              <a:srgbClr val="7030A0"/>
-            </a:solidFill>
-          </a:ln>
-        </p:spPr>
-        <p:txBody>
-          <a:bodyPr wrap="none" rtlCol="0">
-            <a:spAutoFit/>
-          </a:bodyPr>
-          <a:lstStyle/>
-          <a:p>
-            <a:r>
-              <a:rPr lang="en-GB" sz="1400" dirty="0"/>
-              <a:t>model loop time interval</a:t>
-            </a:r>
-          </a:p>
-        </p:txBody>
-      </p:sp>
-      <p:sp>
-        <p:nvSpPr>
-          <p:cNvPr id="61" name="TextBox 60">
-            <a:extLst>
-              <a:ext uri="{FF2B5EF4-FFF2-40B4-BE49-F238E27FC236}">
-                <a16:creationId xmlns:a16="http://schemas.microsoft.com/office/drawing/2014/main" id="{BF710A5E-DE23-724E-90DC-46E039466372}"/>
-              </a:ext>
-            </a:extLst>
-          </p:cNvPr>
-          <p:cNvSpPr txBox="1"/>
-          <p:nvPr/>
-        </p:nvSpPr>
-        <p:spPr>
-          <a:xfrm>
-            <a:off x="6675812" y="1159789"/>
-            <a:ext cx="2360814" cy="738664"/>
-          </a:xfrm>
-          <a:prstGeom prst="rect">
-            <a:avLst/>
-          </a:prstGeom>
-          <a:noFill/>
-        </p:spPr>
-        <p:txBody>
-          <a:bodyPr wrap="square" rtlCol="0">
-            <a:spAutoFit/>
-          </a:bodyPr>
-          <a:lstStyle/>
-          <a:p>
-            <a:r>
-              <a:rPr lang="en-GB" sz="1400" dirty="0"/>
-              <a:t>and the tolerances for integration that determine the adaptive </a:t>
-            </a:r>
-          </a:p>
-        </p:txBody>
-      </p:sp>
-      <p:sp>
-        <p:nvSpPr>
-          <p:cNvPr id="72" name="TextBox 71">
-            <a:extLst>
-              <a:ext uri="{FF2B5EF4-FFF2-40B4-BE49-F238E27FC236}">
-                <a16:creationId xmlns:a16="http://schemas.microsoft.com/office/drawing/2014/main" id="{41910B29-CCA8-9E41-B71F-ED08145FBF8E}"/>
-              </a:ext>
-            </a:extLst>
-          </p:cNvPr>
-          <p:cNvSpPr txBox="1"/>
-          <p:nvPr/>
-        </p:nvSpPr>
-        <p:spPr>
-          <a:xfrm>
-            <a:off x="6755827" y="1857147"/>
-            <a:ext cx="1715534" cy="307777"/>
-          </a:xfrm>
-          <a:prstGeom prst="rect">
-            <a:avLst/>
-          </a:prstGeom>
-          <a:noFill/>
-          <a:ln w="28575">
-            <a:solidFill>
-              <a:schemeClr val="accent6">
-                <a:lumMod val="60000"/>
-                <a:lumOff val="40000"/>
-              </a:schemeClr>
-            </a:solidFill>
-          </a:ln>
-        </p:spPr>
-        <p:txBody>
-          <a:bodyPr wrap="none" rtlCol="0">
-            <a:spAutoFit/>
-          </a:bodyPr>
-          <a:lstStyle/>
-          <a:p>
-            <a:r>
-              <a:rPr lang="en-GB" sz="1400" dirty="0"/>
-              <a:t>integration time step</a:t>
+            <a:pPr algn="ctr"/>
+            <a:r>
+              <a:rPr lang="en-GB" sz="1400" dirty="0">
+                <a:latin typeface="Corbel" panose="020B0503020204020204" pitchFamily="34" charset="0"/>
+              </a:rPr>
+              <a:t>boundary condition time interval loop</a:t>
             </a:r>
           </a:p>
         </p:txBody>
@@ -4515,10 +4481,10 @@
       </p:cxnSp>
       <p:sp>
         <p:nvSpPr>
-          <p:cNvPr id="75" name="TextBox 74">
+          <p:cNvPr id="2" name="TextBox 1">
             <a:extLst>
               <a:ext uri="{FF2B5EF4-FFF2-40B4-BE49-F238E27FC236}">
-                <a16:creationId xmlns:a16="http://schemas.microsoft.com/office/drawing/2014/main" id="{D920D29D-51E0-074C-A719-65B59489AD10}"/>
+                <a16:creationId xmlns:a16="http://schemas.microsoft.com/office/drawing/2014/main" id="{6E8F8573-DB80-614C-B25B-FA41D6154608}"/>
               </a:ext>
             </a:extLst>
           </p:cNvPr>
@@ -4527,20 +4493,15 @@
         </p:nvSpPr>
         <p:spPr>
           <a:xfrm>
-            <a:off x="6780117" y="3387751"/>
-            <a:ext cx="2152203" cy="954107"/>
+            <a:off x="6675812" y="613653"/>
+            <a:ext cx="2468188" cy="738664"/>
           </a:xfrm>
           <a:prstGeom prst="rect">
             <a:avLst/>
           </a:prstGeom>
           <a:noFill/>
-          <a:ln w="28575">
-            <a:solidFill>
-              <a:schemeClr val="accent6">
-                <a:lumMod val="60000"/>
-                <a:lumOff val="40000"/>
-              </a:schemeClr>
-            </a:solidFill>
+          <a:ln>
+            <a:noFill/>
           </a:ln>
         </p:spPr>
         <p:txBody>
@@ -4550,18 +4511,303 @@
           <a:lstStyle/>
           <a:p>
             <a:r>
-              <a:rPr lang="en-GB" sz="1400" dirty="0"/>
-              <a:t>integration time step is adaptive depending on tolerances and problem stiffness</a:t>
-            </a:r>
-          </a:p>
-        </p:txBody>
-      </p:sp>
-      <p:sp>
-        <p:nvSpPr>
-          <p:cNvPr id="76" name="TextBox 75">
+              <a:rPr lang="en-GB" sz="1400" dirty="0">
+                <a:latin typeface="Corbel" panose="020B0503020204020204" pitchFamily="34" charset="0"/>
+              </a:rPr>
+              <a:t>User sets time interval for updating boundary conditions</a:t>
+            </a:r>
+          </a:p>
+          <a:p>
+            <a:r>
+              <a:rPr lang="en-GB" sz="1400" dirty="0">
+                <a:latin typeface="Corbel" panose="020B0503020204020204" pitchFamily="34" charset="0"/>
+              </a:rPr>
+              <a:t>and particle number processes</a:t>
+            </a:r>
+          </a:p>
+        </p:txBody>
+      </p:sp>
+      <p:cxnSp>
+        <p:nvCxnSpPr>
+          <p:cNvPr id="48" name="Elbow Connector 47">
             <a:extLst>
               <a:ext uri="{FF2B5EF4-FFF2-40B4-BE49-F238E27FC236}">
-                <a16:creationId xmlns:a16="http://schemas.microsoft.com/office/drawing/2014/main" id="{404ECD76-125F-6B48-B7E4-6D4ECACC57C4}"/>
+                <a16:creationId xmlns:a16="http://schemas.microsoft.com/office/drawing/2014/main" id="{7186C257-8D35-2B40-AD1F-92678C7066D7}"/>
+              </a:ext>
+            </a:extLst>
+          </p:cNvPr>
+          <p:cNvCxnSpPr>
+            <a:cxnSpLocks/>
+          </p:cNvCxnSpPr>
+          <p:nvPr/>
+        </p:nvCxnSpPr>
+        <p:spPr>
+          <a:xfrm rot="5400000">
+            <a:off x="6091686" y="3857533"/>
+            <a:ext cx="689010" cy="285561"/>
+          </a:xfrm>
+          <a:prstGeom prst="bentConnector3">
+            <a:avLst>
+              <a:gd name="adj1" fmla="val 98894"/>
+            </a:avLst>
+          </a:prstGeom>
+          <a:ln w="28575">
+            <a:solidFill>
+              <a:schemeClr val="tx1"/>
+            </a:solidFill>
+            <a:tailEnd type="triangle"/>
+          </a:ln>
+        </p:spPr>
+        <p:style>
+          <a:lnRef idx="1">
+            <a:schemeClr val="accent1"/>
+          </a:lnRef>
+          <a:fillRef idx="0">
+            <a:schemeClr val="accent1"/>
+          </a:fillRef>
+          <a:effectRef idx="0">
+            <a:schemeClr val="accent1"/>
+          </a:effectRef>
+          <a:fontRef idx="minor">
+            <a:schemeClr val="tx1"/>
+          </a:fontRef>
+        </p:style>
+      </p:cxnSp>
+      <p:cxnSp>
+        <p:nvCxnSpPr>
+          <p:cNvPr id="50" name="Elbow Connector 49">
+            <a:extLst>
+              <a:ext uri="{FF2B5EF4-FFF2-40B4-BE49-F238E27FC236}">
+                <a16:creationId xmlns:a16="http://schemas.microsoft.com/office/drawing/2014/main" id="{FA46F6BA-E609-1D43-8F63-5ACCB1CEBE06}"/>
+              </a:ext>
+            </a:extLst>
+          </p:cNvPr>
+          <p:cNvCxnSpPr>
+            <a:cxnSpLocks/>
+          </p:cNvCxnSpPr>
+          <p:nvPr/>
+        </p:nvCxnSpPr>
+        <p:spPr>
+          <a:xfrm rot="16200000" flipV="1">
+            <a:off x="3220462" y="3300416"/>
+            <a:ext cx="1692276" cy="374348"/>
+          </a:xfrm>
+          <a:prstGeom prst="bentConnector3">
+            <a:avLst>
+              <a:gd name="adj1" fmla="val 706"/>
+            </a:avLst>
+          </a:prstGeom>
+          <a:ln w="28575">
+            <a:solidFill>
+              <a:schemeClr val="tx1"/>
+            </a:solidFill>
+            <a:tailEnd type="triangle"/>
+          </a:ln>
+        </p:spPr>
+        <p:style>
+          <a:lnRef idx="1">
+            <a:schemeClr val="accent1"/>
+          </a:lnRef>
+          <a:fillRef idx="0">
+            <a:schemeClr val="accent1"/>
+          </a:fillRef>
+          <a:effectRef idx="0">
+            <a:schemeClr val="accent1"/>
+          </a:effectRef>
+          <a:fontRef idx="minor">
+            <a:schemeClr val="tx1"/>
+          </a:fontRef>
+        </p:style>
+      </p:cxnSp>
+      <p:cxnSp>
+        <p:nvCxnSpPr>
+          <p:cNvPr id="58" name="Straight Connector 57">
+            <a:extLst>
+              <a:ext uri="{FF2B5EF4-FFF2-40B4-BE49-F238E27FC236}">
+                <a16:creationId xmlns:a16="http://schemas.microsoft.com/office/drawing/2014/main" id="{E9317722-6330-024B-9A7D-7CD0200A70BA}"/>
+              </a:ext>
+            </a:extLst>
+          </p:cNvPr>
+          <p:cNvCxnSpPr>
+            <a:cxnSpLocks/>
+          </p:cNvCxnSpPr>
+          <p:nvPr/>
+        </p:nvCxnSpPr>
+        <p:spPr>
+          <a:xfrm>
+            <a:off x="6477048" y="4457113"/>
+            <a:ext cx="1446" cy="1243412"/>
+          </a:xfrm>
+          <a:prstGeom prst="line">
+            <a:avLst/>
+          </a:prstGeom>
+          <a:ln w="28575">
+            <a:solidFill>
+              <a:schemeClr val="tx1"/>
+            </a:solidFill>
+            <a:prstDash val="sysDot"/>
+            <a:headEnd type="none" w="med" len="med"/>
+            <a:tailEnd type="triangle" w="med" len="med"/>
+          </a:ln>
+        </p:spPr>
+        <p:style>
+          <a:lnRef idx="1">
+            <a:schemeClr val="accent1"/>
+          </a:lnRef>
+          <a:fillRef idx="0">
+            <a:schemeClr val="accent1"/>
+          </a:fillRef>
+          <a:effectRef idx="0">
+            <a:schemeClr val="accent1"/>
+          </a:effectRef>
+          <a:fontRef idx="minor">
+            <a:schemeClr val="tx1"/>
+          </a:fontRef>
+        </p:style>
+      </p:cxnSp>
+      <p:cxnSp>
+        <p:nvCxnSpPr>
+          <p:cNvPr id="62" name="Straight Connector 61">
+            <a:extLst>
+              <a:ext uri="{FF2B5EF4-FFF2-40B4-BE49-F238E27FC236}">
+                <a16:creationId xmlns:a16="http://schemas.microsoft.com/office/drawing/2014/main" id="{9D7D4D0C-7A53-7D4B-9289-AF11B962FBD8}"/>
+              </a:ext>
+            </a:extLst>
+          </p:cNvPr>
+          <p:cNvCxnSpPr>
+            <a:cxnSpLocks/>
+          </p:cNvCxnSpPr>
+          <p:nvPr/>
+        </p:nvCxnSpPr>
+        <p:spPr>
+          <a:xfrm flipV="1">
+            <a:off x="3998138" y="4424939"/>
+            <a:ext cx="0" cy="1275135"/>
+          </a:xfrm>
+          <a:prstGeom prst="line">
+            <a:avLst/>
+          </a:prstGeom>
+          <a:ln w="28575">
+            <a:solidFill>
+              <a:schemeClr val="tx1"/>
+            </a:solidFill>
+            <a:prstDash val="sysDot"/>
+            <a:headEnd type="none" w="med" len="med"/>
+            <a:tailEnd type="triangle" w="med" len="med"/>
+          </a:ln>
+        </p:spPr>
+        <p:style>
+          <a:lnRef idx="1">
+            <a:schemeClr val="accent1"/>
+          </a:lnRef>
+          <a:fillRef idx="0">
+            <a:schemeClr val="accent1"/>
+          </a:fillRef>
+          <a:effectRef idx="0">
+            <a:schemeClr val="accent1"/>
+          </a:effectRef>
+          <a:fontRef idx="minor">
+            <a:schemeClr val="tx1"/>
+          </a:fontRef>
+        </p:style>
+      </p:cxnSp>
+      <p:cxnSp>
+        <p:nvCxnSpPr>
+          <p:cNvPr id="73" name="Straight Connector 72">
+            <a:extLst>
+              <a:ext uri="{FF2B5EF4-FFF2-40B4-BE49-F238E27FC236}">
+                <a16:creationId xmlns:a16="http://schemas.microsoft.com/office/drawing/2014/main" id="{5AF5A195-7FAD-F041-8FB1-15595813C940}"/>
+              </a:ext>
+            </a:extLst>
+          </p:cNvPr>
+          <p:cNvCxnSpPr>
+            <a:cxnSpLocks/>
+          </p:cNvCxnSpPr>
+          <p:nvPr/>
+        </p:nvCxnSpPr>
+        <p:spPr>
+          <a:xfrm flipH="1">
+            <a:off x="4521209" y="4323463"/>
+            <a:ext cx="1478538" cy="0"/>
+          </a:xfrm>
+          <a:prstGeom prst="line">
+            <a:avLst/>
+          </a:prstGeom>
+          <a:ln w="28575">
+            <a:solidFill>
+              <a:schemeClr val="tx1"/>
+            </a:solidFill>
+            <a:headEnd type="none" w="med" len="med"/>
+            <a:tailEnd type="triangle" w="med" len="med"/>
+          </a:ln>
+        </p:spPr>
+        <p:style>
+          <a:lnRef idx="1">
+            <a:schemeClr val="accent1"/>
+          </a:lnRef>
+          <a:fillRef idx="0">
+            <a:schemeClr val="accent1"/>
+          </a:fillRef>
+          <a:effectRef idx="0">
+            <a:schemeClr val="accent1"/>
+          </a:effectRef>
+          <a:fontRef idx="minor">
+            <a:schemeClr val="tx1"/>
+          </a:fontRef>
+        </p:style>
+      </p:cxnSp>
+      <p:cxnSp>
+        <p:nvCxnSpPr>
+          <p:cNvPr id="81" name="Straight Connector 80">
+            <a:extLst>
+              <a:ext uri="{FF2B5EF4-FFF2-40B4-BE49-F238E27FC236}">
+                <a16:creationId xmlns:a16="http://schemas.microsoft.com/office/drawing/2014/main" id="{DE9B7C2B-4026-1942-AEDC-8E8F6A6C850A}"/>
+              </a:ext>
+            </a:extLst>
+          </p:cNvPr>
+          <p:cNvCxnSpPr>
+            <a:cxnSpLocks/>
+          </p:cNvCxnSpPr>
+          <p:nvPr/>
+        </p:nvCxnSpPr>
+        <p:spPr>
+          <a:xfrm flipH="1">
+            <a:off x="3998138" y="5812368"/>
+            <a:ext cx="2500619" cy="0"/>
+          </a:xfrm>
+          <a:prstGeom prst="line">
+            <a:avLst/>
+          </a:prstGeom>
+          <a:ln w="28575">
+            <a:solidFill>
+              <a:schemeClr val="tx1"/>
+            </a:solidFill>
+            <a:prstDash val="sysDot"/>
+            <a:headEnd type="none" w="med" len="med"/>
+            <a:tailEnd type="triangle" w="med" len="med"/>
+          </a:ln>
+        </p:spPr>
+        <p:style>
+          <a:lnRef idx="1">
+            <a:schemeClr val="accent1"/>
+          </a:lnRef>
+          <a:fillRef idx="0">
+            <a:schemeClr val="accent1"/>
+          </a:fillRef>
+          <a:effectRef idx="0">
+            <a:schemeClr val="accent1"/>
+          </a:effectRef>
+          <a:fontRef idx="minor">
+            <a:schemeClr val="tx1"/>
+          </a:fontRef>
+        </p:style>
+      </p:cxnSp>
+      <p:sp>
+        <p:nvSpPr>
+          <p:cNvPr id="87" name="TextBox 86">
+            <a:extLst>
+              <a:ext uri="{FF2B5EF4-FFF2-40B4-BE49-F238E27FC236}">
+                <a16:creationId xmlns:a16="http://schemas.microsoft.com/office/drawing/2014/main" id="{5B120BC2-4B93-404B-BD16-AD877CF6B7B8}"/>
               </a:ext>
             </a:extLst>
           </p:cNvPr>
@@ -4570,18 +4816,13 @@
         </p:nvSpPr>
         <p:spPr>
           <a:xfrm>
-            <a:off x="6715722" y="2392381"/>
-            <a:ext cx="2259835" cy="3108543"/>
+            <a:off x="6705557" y="2252866"/>
+            <a:ext cx="2454484" cy="1386257"/>
           </a:xfrm>
           <a:prstGeom prst="rect">
             <a:avLst/>
           </a:prstGeom>
           <a:noFill/>
-          <a:ln w="28575">
-            <a:solidFill>
-              <a:srgbClr val="7030A0"/>
-            </a:solidFill>
-          </a:ln>
         </p:spPr>
         <p:txBody>
           <a:bodyPr wrap="square" rtlCol="0">
@@ -4590,42 +4831,134 @@
           <a:lstStyle/>
           <a:p>
             <a:r>
-              <a:rPr lang="en-GB" sz="1400" dirty="0"/>
-              <a:t>model loop time interval for non-integration steps is constant unless adapted by moving-centre</a:t>
-            </a:r>
-          </a:p>
-          <a:p>
-            <a:endParaRPr lang="en-GB" sz="1400" dirty="0"/>
-          </a:p>
-          <a:p>
-            <a:endParaRPr lang="en-GB" sz="1400" dirty="0"/>
-          </a:p>
-          <a:p>
-            <a:endParaRPr lang="en-GB" sz="1400" dirty="0"/>
-          </a:p>
-          <a:p>
-            <a:endParaRPr lang="en-GB" sz="1400" dirty="0"/>
-          </a:p>
-          <a:p>
-            <a:endParaRPr lang="en-GB" sz="1400" dirty="0"/>
-          </a:p>
-          <a:p>
-            <a:endParaRPr lang="en-GB" sz="1400" dirty="0"/>
-          </a:p>
-          <a:p>
-            <a:endParaRPr lang="en-GB" sz="1400" dirty="0"/>
-          </a:p>
-          <a:p>
-            <a:endParaRPr lang="en-GB" sz="1400" dirty="0"/>
-          </a:p>
-          <a:p>
-            <a:endParaRPr lang="en-GB" sz="1400" dirty="0"/>
-          </a:p>
-          <a:p>
-            <a:endParaRPr lang="en-GB" sz="1400" dirty="0"/>
-          </a:p>
-        </p:txBody>
-      </p:sp>
+              <a:rPr lang="en-GB" sz="1400" dirty="0">
+                <a:latin typeface="Corbel" panose="020B0503020204020204" pitchFamily="34" charset="0"/>
+              </a:rPr>
+              <a:t>Boundary condition time interval automatically reduced if change to boundary condition occurs before user-defined boundary condition interval</a:t>
+            </a:r>
+          </a:p>
+        </p:txBody>
+      </p:sp>
+      <p:sp>
+        <p:nvSpPr>
+          <p:cNvPr id="88" name="TextBox 87">
+            <a:extLst>
+              <a:ext uri="{FF2B5EF4-FFF2-40B4-BE49-F238E27FC236}">
+                <a16:creationId xmlns:a16="http://schemas.microsoft.com/office/drawing/2014/main" id="{DB2AA48B-3277-DC40-A9E5-58C6AFCB5637}"/>
+              </a:ext>
+            </a:extLst>
+          </p:cNvPr>
+          <p:cNvSpPr txBox="1"/>
+          <p:nvPr/>
+        </p:nvSpPr>
+        <p:spPr>
+          <a:xfrm>
+            <a:off x="6705558" y="3655808"/>
+            <a:ext cx="2310106" cy="738664"/>
+          </a:xfrm>
+          <a:prstGeom prst="rect">
+            <a:avLst/>
+          </a:prstGeom>
+          <a:noFill/>
+        </p:spPr>
+        <p:txBody>
+          <a:bodyPr wrap="square" rtlCol="0">
+            <a:spAutoFit/>
+          </a:bodyPr>
+          <a:lstStyle/>
+          <a:p>
+            <a:r>
+              <a:rPr lang="en-GB" sz="1400" dirty="0">
+                <a:latin typeface="Corbel" panose="020B0503020204020204" pitchFamily="34" charset="0"/>
+              </a:rPr>
+              <a:t>Integrator sets adaptive time step depending on problem stiffness</a:t>
+            </a:r>
+          </a:p>
+        </p:txBody>
+      </p:sp>
+      <p:sp>
+        <p:nvSpPr>
+          <p:cNvPr id="89" name="TextBox 88">
+            <a:extLst>
+              <a:ext uri="{FF2B5EF4-FFF2-40B4-BE49-F238E27FC236}">
+                <a16:creationId xmlns:a16="http://schemas.microsoft.com/office/drawing/2014/main" id="{5FF1B82D-2C3D-E842-B87A-016E681812AB}"/>
+              </a:ext>
+            </a:extLst>
+          </p:cNvPr>
+          <p:cNvSpPr txBox="1"/>
+          <p:nvPr/>
+        </p:nvSpPr>
+        <p:spPr>
+          <a:xfrm>
+            <a:off x="6665451" y="4494391"/>
+            <a:ext cx="2310106" cy="1169551"/>
+          </a:xfrm>
+          <a:prstGeom prst="rect">
+            <a:avLst/>
+          </a:prstGeom>
+          <a:noFill/>
+        </p:spPr>
+        <p:txBody>
+          <a:bodyPr wrap="square" rtlCol="0">
+            <a:spAutoFit/>
+          </a:bodyPr>
+          <a:lstStyle/>
+          <a:p>
+            <a:r>
+              <a:rPr lang="en-GB" sz="1400" dirty="0">
+                <a:latin typeface="Corbel" panose="020B0503020204020204" pitchFamily="34" charset="0"/>
+              </a:rPr>
+              <a:t>When setting the time interval for particle number processes user must consider sensitivity of key system properties</a:t>
+            </a:r>
+          </a:p>
+        </p:txBody>
+      </p:sp>
+      <p:cxnSp>
+        <p:nvCxnSpPr>
+          <p:cNvPr id="100" name="Elbow Connector 99">
+            <a:extLst>
+              <a:ext uri="{FF2B5EF4-FFF2-40B4-BE49-F238E27FC236}">
+                <a16:creationId xmlns:a16="http://schemas.microsoft.com/office/drawing/2014/main" id="{D5E18C4D-87B0-0D40-9A8A-3B9A37B42A11}"/>
+              </a:ext>
+            </a:extLst>
+          </p:cNvPr>
+          <p:cNvCxnSpPr>
+            <a:cxnSpLocks/>
+          </p:cNvCxnSpPr>
+          <p:nvPr/>
+        </p:nvCxnSpPr>
+        <p:spPr>
+          <a:xfrm rot="5400000">
+            <a:off x="2955273" y="4030337"/>
+            <a:ext cx="898101" cy="838427"/>
+          </a:xfrm>
+          <a:prstGeom prst="bentConnector3">
+            <a:avLst>
+              <a:gd name="adj1" fmla="val 1820"/>
+            </a:avLst>
+          </a:prstGeom>
+          <a:ln w="28575">
+            <a:solidFill>
+              <a:schemeClr val="tx1"/>
+            </a:solidFill>
+            <a:tailEnd type="triangle"/>
+          </a:ln>
+        </p:spPr>
+        <p:style>
+          <a:lnRef idx="1">
+            <a:schemeClr val="accent1"/>
+          </a:lnRef>
+          <a:fillRef idx="0">
+            <a:schemeClr val="accent1"/>
+          </a:fillRef>
+          <a:effectRef idx="0">
+            <a:schemeClr val="accent1"/>
+          </a:effectRef>
+          <a:fontRef idx="minor">
+            <a:schemeClr val="tx1"/>
+          </a:fontRef>
+        </p:style>
+      </p:cxnSp>
     </p:spTree>
     <p:extLst>
       <p:ext uri="{BB962C8B-B14F-4D97-AF65-F5344CB8AC3E}">

</xml_diff>

<commit_message>
removed bc time interval and modified nucleation
</commit_message>
<xml_diff>
--- a/PyCHAM/output/GMD_paper/Results/model_flow_diagram.pptx
+++ b/PyCHAM/output/GMD_paper/Results/model_flow_diagram.pptx
@@ -243,7 +243,7 @@
           <a:p>
             <a:fld id="{CD0ADA31-5820-614A-9D16-8F4F9317ADA4}" type="datetimeFigureOut">
               <a:rPr lang="en-GB" smtClean="0"/>
-              <a:t>09/06/2020</a:t>
+              <a:t>09/07/2020</a:t>
             </a:fld>
             <a:endParaRPr lang="en-GB"/>
           </a:p>
@@ -413,7 +413,7 @@
           <a:p>
             <a:fld id="{CD0ADA31-5820-614A-9D16-8F4F9317ADA4}" type="datetimeFigureOut">
               <a:rPr lang="en-GB" smtClean="0"/>
-              <a:t>09/06/2020</a:t>
+              <a:t>09/07/2020</a:t>
             </a:fld>
             <a:endParaRPr lang="en-GB"/>
           </a:p>
@@ -593,7 +593,7 @@
           <a:p>
             <a:fld id="{CD0ADA31-5820-614A-9D16-8F4F9317ADA4}" type="datetimeFigureOut">
               <a:rPr lang="en-GB" smtClean="0"/>
-              <a:t>09/06/2020</a:t>
+              <a:t>09/07/2020</a:t>
             </a:fld>
             <a:endParaRPr lang="en-GB"/>
           </a:p>
@@ -763,7 +763,7 @@
           <a:p>
             <a:fld id="{CD0ADA31-5820-614A-9D16-8F4F9317ADA4}" type="datetimeFigureOut">
               <a:rPr lang="en-GB" smtClean="0"/>
-              <a:t>09/06/2020</a:t>
+              <a:t>09/07/2020</a:t>
             </a:fld>
             <a:endParaRPr lang="en-GB"/>
           </a:p>
@@ -1007,7 +1007,7 @@
           <a:p>
             <a:fld id="{CD0ADA31-5820-614A-9D16-8F4F9317ADA4}" type="datetimeFigureOut">
               <a:rPr lang="en-GB" smtClean="0"/>
-              <a:t>09/06/2020</a:t>
+              <a:t>09/07/2020</a:t>
             </a:fld>
             <a:endParaRPr lang="en-GB"/>
           </a:p>
@@ -1239,7 +1239,7 @@
           <a:p>
             <a:fld id="{CD0ADA31-5820-614A-9D16-8F4F9317ADA4}" type="datetimeFigureOut">
               <a:rPr lang="en-GB" smtClean="0"/>
-              <a:t>09/06/2020</a:t>
+              <a:t>09/07/2020</a:t>
             </a:fld>
             <a:endParaRPr lang="en-GB"/>
           </a:p>
@@ -1606,7 +1606,7 @@
           <a:p>
             <a:fld id="{CD0ADA31-5820-614A-9D16-8F4F9317ADA4}" type="datetimeFigureOut">
               <a:rPr lang="en-GB" smtClean="0"/>
-              <a:t>09/06/2020</a:t>
+              <a:t>09/07/2020</a:t>
             </a:fld>
             <a:endParaRPr lang="en-GB"/>
           </a:p>
@@ -1724,7 +1724,7 @@
           <a:p>
             <a:fld id="{CD0ADA31-5820-614A-9D16-8F4F9317ADA4}" type="datetimeFigureOut">
               <a:rPr lang="en-GB" smtClean="0"/>
-              <a:t>09/06/2020</a:t>
+              <a:t>09/07/2020</a:t>
             </a:fld>
             <a:endParaRPr lang="en-GB"/>
           </a:p>
@@ -1819,7 +1819,7 @@
           <a:p>
             <a:fld id="{CD0ADA31-5820-614A-9D16-8F4F9317ADA4}" type="datetimeFigureOut">
               <a:rPr lang="en-GB" smtClean="0"/>
-              <a:t>09/06/2020</a:t>
+              <a:t>09/07/2020</a:t>
             </a:fld>
             <a:endParaRPr lang="en-GB"/>
           </a:p>
@@ -2096,7 +2096,7 @@
           <a:p>
             <a:fld id="{CD0ADA31-5820-614A-9D16-8F4F9317ADA4}" type="datetimeFigureOut">
               <a:rPr lang="en-GB" smtClean="0"/>
-              <a:t>09/06/2020</a:t>
+              <a:t>09/07/2020</a:t>
             </a:fld>
             <a:endParaRPr lang="en-GB"/>
           </a:p>
@@ -2353,7 +2353,7 @@
           <a:p>
             <a:fld id="{CD0ADA31-5820-614A-9D16-8F4F9317ADA4}" type="datetimeFigureOut">
               <a:rPr lang="en-GB" smtClean="0"/>
-              <a:t>09/06/2020</a:t>
+              <a:t>09/07/2020</a:t>
             </a:fld>
             <a:endParaRPr lang="en-GB"/>
           </a:p>
@@ -2566,7 +2566,7 @@
           <a:p>
             <a:fld id="{CD0ADA31-5820-614A-9D16-8F4F9317ADA4}" type="datetimeFigureOut">
               <a:rPr lang="en-GB" smtClean="0"/>
-              <a:t>09/06/2020</a:t>
+              <a:t>09/07/2020</a:t>
             </a:fld>
             <a:endParaRPr lang="en-GB"/>
           </a:p>
@@ -2983,50 +2983,10 @@
       </p:grpSpPr>
       <p:sp>
         <p:nvSpPr>
-          <p:cNvPr id="53" name="TextBox 52">
+          <p:cNvPr id="39" name="Rectangle 38">
             <a:extLst>
               <a:ext uri="{FF2B5EF4-FFF2-40B4-BE49-F238E27FC236}">
-                <a16:creationId xmlns:a16="http://schemas.microsoft.com/office/drawing/2014/main" id="{922AF99E-1C1C-7F47-ABC7-BD2116A7C209}"/>
-              </a:ext>
-            </a:extLst>
-          </p:cNvPr>
-          <p:cNvSpPr txBox="1"/>
-          <p:nvPr/>
-        </p:nvSpPr>
-        <p:spPr>
-          <a:xfrm rot="5400000">
-            <a:off x="5197851" y="4702566"/>
-            <a:ext cx="1674374" cy="738664"/>
-          </a:xfrm>
-          <a:prstGeom prst="rect">
-            <a:avLst/>
-          </a:prstGeom>
-          <a:solidFill>
-            <a:srgbClr val="E3AEE7"/>
-          </a:solidFill>
-        </p:spPr>
-        <p:txBody>
-          <a:bodyPr wrap="square" rtlCol="0">
-            <a:spAutoFit/>
-          </a:bodyPr>
-          <a:lstStyle/>
-          <a:p>
-            <a:pPr algn="ctr"/>
-            <a:r>
-              <a:rPr lang="en-GB" sz="1400" dirty="0">
-                <a:latin typeface="Corbel" panose="020B0503020204020204" pitchFamily="34" charset="0"/>
-              </a:rPr>
-              <a:t>particle number processes time interval  reached</a:t>
-            </a:r>
-          </a:p>
-        </p:txBody>
-      </p:sp>
-      <p:sp>
-        <p:nvSpPr>
-          <p:cNvPr id="91" name="Rectangle 90">
-            <a:extLst>
-              <a:ext uri="{FF2B5EF4-FFF2-40B4-BE49-F238E27FC236}">
-                <a16:creationId xmlns:a16="http://schemas.microsoft.com/office/drawing/2014/main" id="{E53AF47B-76D3-204C-ACAE-DFFD1CC5B600}"/>
+                <a16:creationId xmlns:a16="http://schemas.microsoft.com/office/drawing/2014/main" id="{7A85E68F-F9F1-CB43-89EE-BE85AEB782B2}"/>
               </a:ext>
             </a:extLst>
           </p:cNvPr>
@@ -3035,16 +2995,14 @@
         </p:nvSpPr>
         <p:spPr>
           <a:xfrm>
-            <a:off x="7082593" y="1089872"/>
-            <a:ext cx="1909006" cy="226539"/>
+            <a:off x="7427495" y="613653"/>
+            <a:ext cx="994610" cy="307777"/>
           </a:xfrm>
           <a:prstGeom prst="rect">
             <a:avLst/>
           </a:prstGeom>
           <a:solidFill>
-            <a:srgbClr val="E3AEE7">
-              <a:alpha val="41961"/>
-            </a:srgbClr>
+            <a:srgbClr val="B7ED7D"/>
           </a:solidFill>
           <a:ln>
             <a:noFill/>
@@ -3071,63 +3029,7 @@
           <a:lstStyle/>
           <a:p>
             <a:pPr algn="ctr"/>
-            <a:endParaRPr lang="en-GB">
-              <a:latin typeface="Corbel" panose="020B0503020204020204" pitchFamily="34" charset="0"/>
-            </a:endParaRPr>
-          </a:p>
-        </p:txBody>
-      </p:sp>
-      <p:sp>
-        <p:nvSpPr>
-          <p:cNvPr id="90" name="Rectangle 89">
-            <a:extLst>
-              <a:ext uri="{FF2B5EF4-FFF2-40B4-BE49-F238E27FC236}">
-                <a16:creationId xmlns:a16="http://schemas.microsoft.com/office/drawing/2014/main" id="{040B6DE6-32F6-3E4C-977B-A88A46B0FE41}"/>
-              </a:ext>
-            </a:extLst>
-          </p:cNvPr>
-          <p:cNvSpPr/>
-          <p:nvPr/>
-        </p:nvSpPr>
-        <p:spPr>
-          <a:xfrm>
-            <a:off x="7437769" y="889346"/>
-            <a:ext cx="1556084" cy="203765"/>
-          </a:xfrm>
-          <a:prstGeom prst="rect">
-            <a:avLst/>
-          </a:prstGeom>
-          <a:solidFill>
-            <a:srgbClr val="B7ED7D"/>
-          </a:solidFill>
-          <a:ln>
-            <a:noFill/>
-          </a:ln>
-        </p:spPr>
-        <p:style>
-          <a:lnRef idx="2">
-            <a:schemeClr val="accent1">
-              <a:shade val="50000"/>
-            </a:schemeClr>
-          </a:lnRef>
-          <a:fillRef idx="1">
-            <a:schemeClr val="accent1"/>
-          </a:fillRef>
-          <a:effectRef idx="0">
-            <a:schemeClr val="accent1"/>
-          </a:effectRef>
-          <a:fontRef idx="minor">
-            <a:schemeClr val="lt1"/>
-          </a:fontRef>
-        </p:style>
-        <p:txBody>
-          <a:bodyPr rtlCol="0" anchor="ctr"/>
-          <a:lstStyle/>
-          <a:p>
-            <a:pPr algn="ctr"/>
-            <a:endParaRPr lang="en-GB">
-              <a:latin typeface="Corbel" panose="020B0503020204020204" pitchFamily="34" charset="0"/>
-            </a:endParaRPr>
+            <a:endParaRPr lang="en-GB"/>
           </a:p>
         </p:txBody>
       </p:sp>
@@ -3267,10 +3169,10 @@
       </p:sp>
       <p:sp>
         <p:nvSpPr>
-          <p:cNvPr id="7" name="TextBox 6">
+          <p:cNvPr id="8" name="TextBox 7">
             <a:extLst>
               <a:ext uri="{FF2B5EF4-FFF2-40B4-BE49-F238E27FC236}">
-                <a16:creationId xmlns:a16="http://schemas.microsoft.com/office/drawing/2014/main" id="{D294BEAA-A397-8649-9786-EBAF73696B66}"/>
+                <a16:creationId xmlns:a16="http://schemas.microsoft.com/office/drawing/2014/main" id="{5AEE5AD9-9EA7-E944-B7DC-50F1AB6A4EC9}"/>
               </a:ext>
             </a:extLst>
           </p:cNvPr>
@@ -3279,8 +3181,8 @@
         </p:nvSpPr>
         <p:spPr>
           <a:xfrm>
-            <a:off x="4336279" y="2366584"/>
-            <a:ext cx="2292615" cy="307777"/>
+            <a:off x="4383040" y="3491293"/>
+            <a:ext cx="2163842" cy="954107"/>
           </a:xfrm>
           <a:prstGeom prst="rect">
             <a:avLst/>
@@ -3296,7 +3198,7 @@
           </a:ln>
         </p:spPr>
         <p:txBody>
-          <a:bodyPr wrap="none" rtlCol="0">
+          <a:bodyPr wrap="square" rtlCol="0">
             <a:spAutoFit/>
           </a:bodyPr>
           <a:lstStyle/>
@@ -3305,17 +3207,41 @@
               <a:rPr lang="en-GB" sz="1400" dirty="0">
                 <a:latin typeface="Corbel" panose="020B0503020204020204" pitchFamily="34" charset="0"/>
               </a:rPr>
-              <a:t>Update boundary conditions</a:t>
-            </a:r>
-          </a:p>
-        </p:txBody>
-      </p:sp>
-      <p:sp>
-        <p:nvSpPr>
-          <p:cNvPr id="8" name="TextBox 7">
+              <a:t>ii. Integration of:</a:t>
+            </a:r>
+          </a:p>
+          <a:p>
+            <a:r>
+              <a:rPr lang="en-GB" sz="1400" dirty="0">
+                <a:latin typeface="Corbel" panose="020B0503020204020204" pitchFamily="34" charset="0"/>
+              </a:rPr>
+              <a:t>Gas-phase photochemistry</a:t>
+            </a:r>
+          </a:p>
+          <a:p>
+            <a:r>
+              <a:rPr lang="en-GB" sz="1400" dirty="0">
+                <a:latin typeface="Corbel" panose="020B0503020204020204" pitchFamily="34" charset="0"/>
+              </a:rPr>
+              <a:t>Gas-particle partitioning</a:t>
+            </a:r>
+          </a:p>
+          <a:p>
+            <a:r>
+              <a:rPr lang="en-GB" sz="1400" dirty="0">
+                <a:latin typeface="Corbel" panose="020B0503020204020204" pitchFamily="34" charset="0"/>
+              </a:rPr>
+              <a:t>Gas-wall partitioning</a:t>
+            </a:r>
+          </a:p>
+        </p:txBody>
+      </p:sp>
+      <p:sp>
+        <p:nvSpPr>
+          <p:cNvPr id="9" name="TextBox 8">
             <a:extLst>
               <a:ext uri="{FF2B5EF4-FFF2-40B4-BE49-F238E27FC236}">
-                <a16:creationId xmlns:a16="http://schemas.microsoft.com/office/drawing/2014/main" id="{5AEE5AD9-9EA7-E944-B7DC-50F1AB6A4EC9}"/>
+                <a16:creationId xmlns:a16="http://schemas.microsoft.com/office/drawing/2014/main" id="{147A9942-8926-B944-854C-48573B2DA7F2}"/>
               </a:ext>
             </a:extLst>
           </p:cNvPr>
@@ -3324,8 +3250,8 @@
         </p:nvSpPr>
         <p:spPr>
           <a:xfrm>
-            <a:off x="4336996" y="2804310"/>
-            <a:ext cx="2209887" cy="1384995"/>
+            <a:off x="4401855" y="4640327"/>
+            <a:ext cx="2145027" cy="738664"/>
           </a:xfrm>
           <a:prstGeom prst="rect">
             <a:avLst/>
@@ -3350,92 +3276,7 @@
               <a:rPr lang="en-GB" sz="1400" dirty="0">
                 <a:latin typeface="Corbel" panose="020B0503020204020204" pitchFamily="34" charset="0"/>
               </a:rPr>
-              <a:t>Integration of:</a:t>
-            </a:r>
-          </a:p>
-          <a:p>
-            <a:r>
-              <a:rPr lang="en-GB" sz="1400" dirty="0">
-                <a:latin typeface="Corbel" panose="020B0503020204020204" pitchFamily="34" charset="0"/>
-              </a:rPr>
-              <a:t>Gas-phase photochemistry</a:t>
-            </a:r>
-          </a:p>
-          <a:p>
-            <a:r>
-              <a:rPr lang="en-GB" sz="1400" dirty="0">
-                <a:latin typeface="Corbel" panose="020B0503020204020204" pitchFamily="34" charset="0"/>
-              </a:rPr>
-              <a:t>Gas-particle partitioning</a:t>
-            </a:r>
-          </a:p>
-          <a:p>
-            <a:r>
-              <a:rPr lang="en-GB" sz="1400" dirty="0">
-                <a:latin typeface="Corbel" panose="020B0503020204020204" pitchFamily="34" charset="0"/>
-              </a:rPr>
-              <a:t>Gas-wall partitioning</a:t>
-            </a:r>
-          </a:p>
-          <a:p>
-            <a:r>
-              <a:rPr lang="en-GB" sz="1400" dirty="0">
-                <a:latin typeface="Corbel" panose="020B0503020204020204" pitchFamily="34" charset="0"/>
-              </a:rPr>
-              <a:t>Followed by:</a:t>
-            </a:r>
-          </a:p>
-          <a:p>
-            <a:r>
-              <a:rPr lang="en-GB" sz="1400" dirty="0">
-                <a:latin typeface="Corbel" panose="020B0503020204020204" pitchFamily="34" charset="0"/>
-              </a:rPr>
-              <a:t>Moving-centre structure</a:t>
-            </a:r>
-          </a:p>
-        </p:txBody>
-      </p:sp>
-      <p:sp>
-        <p:nvSpPr>
-          <p:cNvPr id="9" name="TextBox 8">
-            <a:extLst>
-              <a:ext uri="{FF2B5EF4-FFF2-40B4-BE49-F238E27FC236}">
-                <a16:creationId xmlns:a16="http://schemas.microsoft.com/office/drawing/2014/main" id="{147A9942-8926-B944-854C-48573B2DA7F2}"/>
-              </a:ext>
-            </a:extLst>
-          </p:cNvPr>
-          <p:cNvSpPr txBox="1"/>
-          <p:nvPr/>
-        </p:nvSpPr>
-        <p:spPr>
-          <a:xfrm>
-            <a:off x="4077200" y="4677909"/>
-            <a:ext cx="1650358" cy="954107"/>
-          </a:xfrm>
-          <a:prstGeom prst="rect">
-            <a:avLst/>
-          </a:prstGeom>
-          <a:solidFill>
-            <a:schemeClr val="accent2">
-              <a:lumMod val="40000"/>
-              <a:lumOff val="60000"/>
-            </a:schemeClr>
-          </a:solidFill>
-          <a:ln w="28575">
-            <a:noFill/>
-          </a:ln>
-        </p:spPr>
-        <p:txBody>
-          <a:bodyPr wrap="square" rtlCol="0">
-            <a:spAutoFit/>
-          </a:bodyPr>
-          <a:lstStyle/>
-          <a:p>
-            <a:r>
-              <a:rPr lang="en-GB" sz="1400" dirty="0">
-                <a:latin typeface="Corbel" panose="020B0503020204020204" pitchFamily="34" charset="0"/>
-              </a:rPr>
-              <a:t>Coagulation</a:t>
+              <a:t>iii. Coagulation</a:t>
             </a:r>
           </a:p>
           <a:p>
@@ -4348,12 +4189,52 @@
           </a:fontRef>
         </p:style>
       </p:cxnSp>
+      <p:sp>
+        <p:nvSpPr>
+          <p:cNvPr id="57" name="TextBox 56">
+            <a:extLst>
+              <a:ext uri="{FF2B5EF4-FFF2-40B4-BE49-F238E27FC236}">
+                <a16:creationId xmlns:a16="http://schemas.microsoft.com/office/drawing/2014/main" id="{FD05E6AD-0380-5549-BC60-57362BAEA511}"/>
+              </a:ext>
+            </a:extLst>
+          </p:cNvPr>
+          <p:cNvSpPr txBox="1"/>
+          <p:nvPr/>
+        </p:nvSpPr>
+        <p:spPr>
+          <a:xfrm rot="16200000">
+            <a:off x="2887764" y="3699179"/>
+            <a:ext cx="2443989" cy="307777"/>
+          </a:xfrm>
+          <a:prstGeom prst="rect">
+            <a:avLst/>
+          </a:prstGeom>
+          <a:solidFill>
+            <a:srgbClr val="B7ED7D"/>
+          </a:solidFill>
+        </p:spPr>
+        <p:txBody>
+          <a:bodyPr wrap="square" rtlCol="0">
+            <a:spAutoFit/>
+          </a:bodyPr>
+          <a:lstStyle/>
+          <a:p>
+            <a:pPr algn="ctr"/>
+            <a:r>
+              <a:rPr lang="en-GB" sz="1400" dirty="0">
+                <a:latin typeface="Corbel" panose="020B0503020204020204" pitchFamily="34" charset="0"/>
+              </a:rPr>
+              <a:t>update time interval loop</a:t>
+            </a:r>
+          </a:p>
+        </p:txBody>
+      </p:sp>
       <p:cxnSp>
         <p:nvCxnSpPr>
-          <p:cNvPr id="54" name="Straight Connector 53">
+          <p:cNvPr id="74" name="Straight Connector 73">
             <a:extLst>
               <a:ext uri="{FF2B5EF4-FFF2-40B4-BE49-F238E27FC236}">
-                <a16:creationId xmlns:a16="http://schemas.microsoft.com/office/drawing/2014/main" id="{47D598E3-D6AB-764A-8345-0AD8DAB46A7D}"/>
+                <a16:creationId xmlns:a16="http://schemas.microsoft.com/office/drawing/2014/main" id="{637FC724-0894-DD40-BCAE-5DA4B52FB74C}"/>
               </a:ext>
             </a:extLst>
           </p:cNvPr>
@@ -4363,9 +4244,9 @@
           <p:nvPr/>
         </p:nvCxnSpPr>
         <p:spPr>
-          <a:xfrm flipH="1">
-            <a:off x="3534617" y="5085462"/>
-            <a:ext cx="416016" cy="0"/>
+          <a:xfrm>
+            <a:off x="2677733" y="5257886"/>
+            <a:ext cx="2446" cy="713878"/>
           </a:xfrm>
           <a:prstGeom prst="line">
             <a:avLst/>
@@ -4374,7 +4255,6 @@
             <a:solidFill>
               <a:schemeClr val="tx1"/>
             </a:solidFill>
-            <a:prstDash val="sysDot"/>
             <a:headEnd type="none" w="med" len="med"/>
             <a:tailEnd type="triangle" w="med" len="med"/>
           </a:ln>
@@ -4396,91 +4276,6 @@
       </p:cxnSp>
       <p:sp>
         <p:nvSpPr>
-          <p:cNvPr id="57" name="TextBox 56">
-            <a:extLst>
-              <a:ext uri="{FF2B5EF4-FFF2-40B4-BE49-F238E27FC236}">
-                <a16:creationId xmlns:a16="http://schemas.microsoft.com/office/drawing/2014/main" id="{FD05E6AD-0380-5549-BC60-57362BAEA511}"/>
-              </a:ext>
-            </a:extLst>
-          </p:cNvPr>
-          <p:cNvSpPr txBox="1"/>
-          <p:nvPr/>
-        </p:nvSpPr>
-        <p:spPr>
-          <a:xfrm rot="16200000">
-            <a:off x="3282921" y="3035882"/>
-            <a:ext cx="1685760" cy="523220"/>
-          </a:xfrm>
-          <a:prstGeom prst="rect">
-            <a:avLst/>
-          </a:prstGeom>
-          <a:solidFill>
-            <a:srgbClr val="B7ED7D"/>
-          </a:solidFill>
-        </p:spPr>
-        <p:txBody>
-          <a:bodyPr wrap="square" rtlCol="0">
-            <a:spAutoFit/>
-          </a:bodyPr>
-          <a:lstStyle/>
-          <a:p>
-            <a:pPr algn="ctr"/>
-            <a:r>
-              <a:rPr lang="en-GB" sz="1400" dirty="0">
-                <a:latin typeface="Corbel" panose="020B0503020204020204" pitchFamily="34" charset="0"/>
-              </a:rPr>
-              <a:t>boundary condition time interval loop</a:t>
-            </a:r>
-          </a:p>
-        </p:txBody>
-      </p:sp>
-      <p:cxnSp>
-        <p:nvCxnSpPr>
-          <p:cNvPr id="74" name="Straight Connector 73">
-            <a:extLst>
-              <a:ext uri="{FF2B5EF4-FFF2-40B4-BE49-F238E27FC236}">
-                <a16:creationId xmlns:a16="http://schemas.microsoft.com/office/drawing/2014/main" id="{637FC724-0894-DD40-BCAE-5DA4B52FB74C}"/>
-              </a:ext>
-            </a:extLst>
-          </p:cNvPr>
-          <p:cNvCxnSpPr>
-            <a:cxnSpLocks/>
-          </p:cNvCxnSpPr>
-          <p:nvPr/>
-        </p:nvCxnSpPr>
-        <p:spPr>
-          <a:xfrm>
-            <a:off x="2677733" y="5257886"/>
-            <a:ext cx="2446" cy="713878"/>
-          </a:xfrm>
-          <a:prstGeom prst="line">
-            <a:avLst/>
-          </a:prstGeom>
-          <a:ln w="28575">
-            <a:solidFill>
-              <a:schemeClr val="tx1"/>
-            </a:solidFill>
-            <a:headEnd type="none" w="med" len="med"/>
-            <a:tailEnd type="triangle" w="med" len="med"/>
-          </a:ln>
-        </p:spPr>
-        <p:style>
-          <a:lnRef idx="1">
-            <a:schemeClr val="accent1"/>
-          </a:lnRef>
-          <a:fillRef idx="0">
-            <a:schemeClr val="accent1"/>
-          </a:fillRef>
-          <a:effectRef idx="0">
-            <a:schemeClr val="accent1"/>
-          </a:effectRef>
-          <a:fontRef idx="minor">
-            <a:schemeClr val="tx1"/>
-          </a:fontRef>
-        </p:style>
-      </p:cxnSp>
-      <p:sp>
-        <p:nvSpPr>
           <p:cNvPr id="2" name="TextBox 1">
             <a:extLst>
               <a:ext uri="{FF2B5EF4-FFF2-40B4-BE49-F238E27FC236}">
@@ -4494,7 +4289,7 @@
         <p:spPr>
           <a:xfrm>
             <a:off x="6675812" y="613653"/>
-            <a:ext cx="2468188" cy="738664"/>
+            <a:ext cx="2468188" cy="1384995"/>
           </a:xfrm>
           <a:prstGeom prst="rect">
             <a:avLst/>
@@ -4514,15 +4309,7 @@
               <a:rPr lang="en-GB" sz="1400" dirty="0">
                 <a:latin typeface="Corbel" panose="020B0503020204020204" pitchFamily="34" charset="0"/>
               </a:rPr>
-              <a:t>User sets time interval for updating boundary conditions</a:t>
-            </a:r>
-          </a:p>
-          <a:p>
-            <a:r>
-              <a:rPr lang="en-GB" sz="1400" dirty="0">
-                <a:latin typeface="Corbel" panose="020B0503020204020204" pitchFamily="34" charset="0"/>
-              </a:rPr>
-              <a:t>and particle number processes</a:t>
+              <a:t>User sets time interval for updates to constants (particle number concentration and natural light intensity (where applicable)) in the model variables file</a:t>
             </a:r>
           </a:p>
         </p:txBody>
@@ -4543,12 +4330,12 @@
         </p:nvCxnSpPr>
         <p:spPr>
           <a:xfrm rot="5400000">
-            <a:off x="6091686" y="3857533"/>
-            <a:ext cx="689010" cy="285561"/>
+            <a:off x="5337005" y="4439568"/>
+            <a:ext cx="2025727" cy="458208"/>
           </a:xfrm>
           <a:prstGeom prst="bentConnector3">
             <a:avLst>
-              <a:gd name="adj1" fmla="val 98894"/>
+              <a:gd name="adj1" fmla="val 99891"/>
             </a:avLst>
           </a:prstGeom>
           <a:ln w="28575">
@@ -4589,12 +4376,12 @@
         </p:nvCxnSpPr>
         <p:spPr>
           <a:xfrm rot="16200000" flipV="1">
-            <a:off x="3220462" y="3300416"/>
-            <a:ext cx="1692276" cy="374348"/>
+            <a:off x="2410703" y="3797929"/>
+            <a:ext cx="3332375" cy="381860"/>
           </a:xfrm>
           <a:prstGeom prst="bentConnector3">
             <a:avLst>
-              <a:gd name="adj1" fmla="val 706"/>
+              <a:gd name="adj1" fmla="val -547"/>
             </a:avLst>
           </a:prstGeom>
           <a:ln w="28575">
@@ -4602,98 +4389,6 @@
               <a:schemeClr val="tx1"/>
             </a:solidFill>
             <a:tailEnd type="triangle"/>
-          </a:ln>
-        </p:spPr>
-        <p:style>
-          <a:lnRef idx="1">
-            <a:schemeClr val="accent1"/>
-          </a:lnRef>
-          <a:fillRef idx="0">
-            <a:schemeClr val="accent1"/>
-          </a:fillRef>
-          <a:effectRef idx="0">
-            <a:schemeClr val="accent1"/>
-          </a:effectRef>
-          <a:fontRef idx="minor">
-            <a:schemeClr val="tx1"/>
-          </a:fontRef>
-        </p:style>
-      </p:cxnSp>
-      <p:cxnSp>
-        <p:nvCxnSpPr>
-          <p:cNvPr id="58" name="Straight Connector 57">
-            <a:extLst>
-              <a:ext uri="{FF2B5EF4-FFF2-40B4-BE49-F238E27FC236}">
-                <a16:creationId xmlns:a16="http://schemas.microsoft.com/office/drawing/2014/main" id="{E9317722-6330-024B-9A7D-7CD0200A70BA}"/>
-              </a:ext>
-            </a:extLst>
-          </p:cNvPr>
-          <p:cNvCxnSpPr>
-            <a:cxnSpLocks/>
-          </p:cNvCxnSpPr>
-          <p:nvPr/>
-        </p:nvCxnSpPr>
-        <p:spPr>
-          <a:xfrm>
-            <a:off x="6477048" y="4457113"/>
-            <a:ext cx="1446" cy="1243412"/>
-          </a:xfrm>
-          <a:prstGeom prst="line">
-            <a:avLst/>
-          </a:prstGeom>
-          <a:ln w="28575">
-            <a:solidFill>
-              <a:schemeClr val="tx1"/>
-            </a:solidFill>
-            <a:prstDash val="sysDot"/>
-            <a:headEnd type="none" w="med" len="med"/>
-            <a:tailEnd type="triangle" w="med" len="med"/>
-          </a:ln>
-        </p:spPr>
-        <p:style>
-          <a:lnRef idx="1">
-            <a:schemeClr val="accent1"/>
-          </a:lnRef>
-          <a:fillRef idx="0">
-            <a:schemeClr val="accent1"/>
-          </a:fillRef>
-          <a:effectRef idx="0">
-            <a:schemeClr val="accent1"/>
-          </a:effectRef>
-          <a:fontRef idx="minor">
-            <a:schemeClr val="tx1"/>
-          </a:fontRef>
-        </p:style>
-      </p:cxnSp>
-      <p:cxnSp>
-        <p:nvCxnSpPr>
-          <p:cNvPr id="62" name="Straight Connector 61">
-            <a:extLst>
-              <a:ext uri="{FF2B5EF4-FFF2-40B4-BE49-F238E27FC236}">
-                <a16:creationId xmlns:a16="http://schemas.microsoft.com/office/drawing/2014/main" id="{9D7D4D0C-7A53-7D4B-9289-AF11B962FBD8}"/>
-              </a:ext>
-            </a:extLst>
-          </p:cNvPr>
-          <p:cNvCxnSpPr>
-            <a:cxnSpLocks/>
-          </p:cNvCxnSpPr>
-          <p:nvPr/>
-        </p:nvCxnSpPr>
-        <p:spPr>
-          <a:xfrm flipV="1">
-            <a:off x="3998138" y="4424939"/>
-            <a:ext cx="0" cy="1275135"/>
-          </a:xfrm>
-          <a:prstGeom prst="line">
-            <a:avLst/>
-          </a:prstGeom>
-          <a:ln w="28575">
-            <a:solidFill>
-              <a:schemeClr val="tx1"/>
-            </a:solidFill>
-            <a:prstDash val="sysDot"/>
-            <a:headEnd type="none" w="med" len="med"/>
-            <a:tailEnd type="triangle" w="med" len="med"/>
           </a:ln>
         </p:spPr>
         <p:style>
@@ -4727,7 +4422,7 @@
         </p:nvCxnSpPr>
         <p:spPr>
           <a:xfrm flipH="1">
-            <a:off x="4521209" y="4323463"/>
+            <a:off x="4492057" y="5655046"/>
             <a:ext cx="1478538" cy="0"/>
           </a:xfrm>
           <a:prstGeom prst="line">
@@ -4756,12 +4451,129 @@
           </a:fontRef>
         </p:style>
       </p:cxnSp>
+      <p:sp>
+        <p:nvSpPr>
+          <p:cNvPr id="87" name="TextBox 86">
+            <a:extLst>
+              <a:ext uri="{FF2B5EF4-FFF2-40B4-BE49-F238E27FC236}">
+                <a16:creationId xmlns:a16="http://schemas.microsoft.com/office/drawing/2014/main" id="{5B120BC2-4B93-404B-BD16-AD877CF6B7B8}"/>
+              </a:ext>
+            </a:extLst>
+          </p:cNvPr>
+          <p:cNvSpPr txBox="1"/>
+          <p:nvPr/>
+        </p:nvSpPr>
+        <p:spPr>
+          <a:xfrm>
+            <a:off x="6705557" y="2252866"/>
+            <a:ext cx="2454484" cy="954107"/>
+          </a:xfrm>
+          <a:prstGeom prst="rect">
+            <a:avLst/>
+          </a:prstGeom>
+          <a:noFill/>
+        </p:spPr>
+        <p:txBody>
+          <a:bodyPr wrap="square" rtlCol="0">
+            <a:spAutoFit/>
+          </a:bodyPr>
+          <a:lstStyle/>
+          <a:p>
+            <a:r>
+              <a:rPr lang="en-GB" sz="1400" dirty="0" err="1">
+                <a:latin typeface="Corbel" panose="020B0503020204020204" pitchFamily="34" charset="0"/>
+              </a:rPr>
+              <a:t>i</a:t>
+            </a:r>
+            <a:r>
+              <a:rPr lang="en-GB" sz="1400" dirty="0">
+                <a:latin typeface="Corbel" panose="020B0503020204020204" pitchFamily="34" charset="0"/>
+              </a:rPr>
+              <a:t>. Integration time interval automatically adapted to coincide with discontinuous changes to chamber condition</a:t>
+            </a:r>
+          </a:p>
+        </p:txBody>
+      </p:sp>
+      <p:sp>
+        <p:nvSpPr>
+          <p:cNvPr id="88" name="TextBox 87">
+            <a:extLst>
+              <a:ext uri="{FF2B5EF4-FFF2-40B4-BE49-F238E27FC236}">
+                <a16:creationId xmlns:a16="http://schemas.microsoft.com/office/drawing/2014/main" id="{DB2AA48B-3277-DC40-A9E5-58C6AFCB5637}"/>
+              </a:ext>
+            </a:extLst>
+          </p:cNvPr>
+          <p:cNvSpPr txBox="1"/>
+          <p:nvPr/>
+        </p:nvSpPr>
+        <p:spPr>
+          <a:xfrm>
+            <a:off x="6705557" y="3365011"/>
+            <a:ext cx="2310106" cy="738664"/>
+          </a:xfrm>
+          <a:prstGeom prst="rect">
+            <a:avLst/>
+          </a:prstGeom>
+          <a:noFill/>
+        </p:spPr>
+        <p:txBody>
+          <a:bodyPr wrap="square" rtlCol="0">
+            <a:spAutoFit/>
+          </a:bodyPr>
+          <a:lstStyle/>
+          <a:p>
+            <a:r>
+              <a:rPr lang="en-GB" sz="1400" dirty="0">
+                <a:latin typeface="Corbel" panose="020B0503020204020204" pitchFamily="34" charset="0"/>
+              </a:rPr>
+              <a:t>ii. Integrator sets adaptive time step depending on problem stiffness</a:t>
+            </a:r>
+          </a:p>
+        </p:txBody>
+      </p:sp>
+      <p:sp>
+        <p:nvSpPr>
+          <p:cNvPr id="89" name="TextBox 88">
+            <a:extLst>
+              <a:ext uri="{FF2B5EF4-FFF2-40B4-BE49-F238E27FC236}">
+                <a16:creationId xmlns:a16="http://schemas.microsoft.com/office/drawing/2014/main" id="{5FF1B82D-2C3D-E842-B87A-016E681812AB}"/>
+              </a:ext>
+            </a:extLst>
+          </p:cNvPr>
+          <p:cNvSpPr txBox="1"/>
+          <p:nvPr/>
+        </p:nvSpPr>
+        <p:spPr>
+          <a:xfrm>
+            <a:off x="6729619" y="4494391"/>
+            <a:ext cx="2310106" cy="954107"/>
+          </a:xfrm>
+          <a:prstGeom prst="rect">
+            <a:avLst/>
+          </a:prstGeom>
+          <a:noFill/>
+        </p:spPr>
+        <p:txBody>
+          <a:bodyPr wrap="square" rtlCol="0">
+            <a:spAutoFit/>
+          </a:bodyPr>
+          <a:lstStyle/>
+          <a:p>
+            <a:r>
+              <a:rPr lang="en-GB" sz="1400" dirty="0">
+                <a:latin typeface="Corbel" panose="020B0503020204020204" pitchFamily="34" charset="0"/>
+              </a:rPr>
+              <a:t>iii. When setting the update time interval, user must consider sensitivity of key system properties</a:t>
+            </a:r>
+          </a:p>
+        </p:txBody>
+      </p:sp>
       <p:cxnSp>
         <p:nvCxnSpPr>
-          <p:cNvPr id="81" name="Straight Connector 80">
+          <p:cNvPr id="100" name="Elbow Connector 99">
             <a:extLst>
               <a:ext uri="{FF2B5EF4-FFF2-40B4-BE49-F238E27FC236}">
-                <a16:creationId xmlns:a16="http://schemas.microsoft.com/office/drawing/2014/main" id="{DE9B7C2B-4026-1942-AEDC-8E8F6A6C850A}"/>
+                <a16:creationId xmlns:a16="http://schemas.microsoft.com/office/drawing/2014/main" id="{D5E18C4D-87B0-0D40-9A8A-3B9A37B42A11}"/>
               </a:ext>
             </a:extLst>
           </p:cNvPr>
@@ -4771,20 +4583,20 @@
           <p:nvPr/>
         </p:nvCxnSpPr>
         <p:spPr>
-          <a:xfrm flipH="1">
-            <a:off x="3998138" y="5812368"/>
-            <a:ext cx="2500619" cy="0"/>
-          </a:xfrm>
-          <a:prstGeom prst="line">
-            <a:avLst/>
+          <a:xfrm rot="10800000" flipV="1">
+            <a:off x="2671278" y="4000499"/>
+            <a:ext cx="1152261" cy="915685"/>
+          </a:xfrm>
+          <a:prstGeom prst="bentConnector3">
+            <a:avLst>
+              <a:gd name="adj1" fmla="val 100120"/>
+            </a:avLst>
           </a:prstGeom>
           <a:ln w="28575">
             <a:solidFill>
               <a:schemeClr val="tx1"/>
             </a:solidFill>
-            <a:prstDash val="sysDot"/>
-            <a:headEnd type="none" w="med" len="med"/>
-            <a:tailEnd type="triangle" w="med" len="med"/>
+            <a:tailEnd type="triangle"/>
           </a:ln>
         </p:spPr>
         <p:style>
@@ -4804,10 +4616,10 @@
       </p:cxnSp>
       <p:sp>
         <p:nvSpPr>
-          <p:cNvPr id="87" name="TextBox 86">
+          <p:cNvPr id="55" name="TextBox 54">
             <a:extLst>
               <a:ext uri="{FF2B5EF4-FFF2-40B4-BE49-F238E27FC236}">
-                <a16:creationId xmlns:a16="http://schemas.microsoft.com/office/drawing/2014/main" id="{5B120BC2-4B93-404B-BD16-AD877CF6B7B8}"/>
+                <a16:creationId xmlns:a16="http://schemas.microsoft.com/office/drawing/2014/main" id="{E60C5434-BEFD-5F48-A780-E003C798E7FF}"/>
               </a:ext>
             </a:extLst>
           </p:cNvPr>
@@ -4816,13 +4628,21 @@
         </p:nvSpPr>
         <p:spPr>
           <a:xfrm>
-            <a:off x="6705557" y="2252866"/>
-            <a:ext cx="2454484" cy="1386257"/>
+            <a:off x="4359471" y="2371430"/>
+            <a:ext cx="2187411" cy="954107"/>
           </a:xfrm>
           <a:prstGeom prst="rect">
             <a:avLst/>
           </a:prstGeom>
-          <a:noFill/>
+          <a:solidFill>
+            <a:schemeClr val="accent2">
+              <a:lumMod val="40000"/>
+              <a:lumOff val="60000"/>
+            </a:schemeClr>
+          </a:solidFill>
+          <a:ln w="28575">
+            <a:noFill/>
+          </a:ln>
         </p:spPr>
         <p:txBody>
           <a:bodyPr wrap="square" rtlCol="0">
@@ -4831,134 +4651,32 @@
           <a:lstStyle/>
           <a:p>
             <a:r>
+              <a:rPr lang="en-GB" sz="1400" dirty="0" err="1">
+                <a:latin typeface="Corbel" panose="020B0503020204020204" pitchFamily="34" charset="0"/>
+              </a:rPr>
+              <a:t>i</a:t>
+            </a:r>
+            <a:r>
               <a:rPr lang="en-GB" sz="1400" dirty="0">
                 <a:latin typeface="Corbel" panose="020B0503020204020204" pitchFamily="34" charset="0"/>
               </a:rPr>
-              <a:t>Boundary condition time interval automatically reduced if change to boundary condition occurs before user-defined boundary condition interval</a:t>
-            </a:r>
-          </a:p>
-        </p:txBody>
-      </p:sp>
-      <p:sp>
-        <p:nvSpPr>
-          <p:cNvPr id="88" name="TextBox 87">
-            <a:extLst>
-              <a:ext uri="{FF2B5EF4-FFF2-40B4-BE49-F238E27FC236}">
-                <a16:creationId xmlns:a16="http://schemas.microsoft.com/office/drawing/2014/main" id="{DB2AA48B-3277-DC40-A9E5-58C6AFCB5637}"/>
-              </a:ext>
-            </a:extLst>
-          </p:cNvPr>
-          <p:cNvSpPr txBox="1"/>
-          <p:nvPr/>
-        </p:nvSpPr>
-        <p:spPr>
-          <a:xfrm>
-            <a:off x="6705558" y="3655808"/>
-            <a:ext cx="2310106" cy="738664"/>
-          </a:xfrm>
-          <a:prstGeom prst="rect">
-            <a:avLst/>
-          </a:prstGeom>
-          <a:noFill/>
-        </p:spPr>
-        <p:txBody>
-          <a:bodyPr wrap="square" rtlCol="0">
-            <a:spAutoFit/>
-          </a:bodyPr>
-          <a:lstStyle/>
-          <a:p>
+              <a:t>. Updates to integration constants </a:t>
+            </a:r>
+            <a:r>
+              <a:rPr lang="en-GB" sz="1400">
+                <a:latin typeface="Corbel" panose="020B0503020204020204" pitchFamily="34" charset="0"/>
+              </a:rPr>
+              <a:t>and initial </a:t>
+            </a:r>
             <a:r>
               <a:rPr lang="en-GB" sz="1400" dirty="0">
                 <a:latin typeface="Corbel" panose="020B0503020204020204" pitchFamily="34" charset="0"/>
               </a:rPr>
-              <a:t>Integrator sets adaptive time step depending on problem stiffness</a:t>
-            </a:r>
-          </a:p>
-        </p:txBody>
-      </p:sp>
-      <p:sp>
-        <p:nvSpPr>
-          <p:cNvPr id="89" name="TextBox 88">
-            <a:extLst>
-              <a:ext uri="{FF2B5EF4-FFF2-40B4-BE49-F238E27FC236}">
-                <a16:creationId xmlns:a16="http://schemas.microsoft.com/office/drawing/2014/main" id="{5FF1B82D-2C3D-E842-B87A-016E681812AB}"/>
-              </a:ext>
-            </a:extLst>
-          </p:cNvPr>
-          <p:cNvSpPr txBox="1"/>
-          <p:nvPr/>
-        </p:nvSpPr>
-        <p:spPr>
-          <a:xfrm>
-            <a:off x="6665451" y="4494391"/>
-            <a:ext cx="2310106" cy="1169551"/>
-          </a:xfrm>
-          <a:prstGeom prst="rect">
-            <a:avLst/>
-          </a:prstGeom>
-          <a:noFill/>
-        </p:spPr>
-        <p:txBody>
-          <a:bodyPr wrap="square" rtlCol="0">
-            <a:spAutoFit/>
-          </a:bodyPr>
-          <a:lstStyle/>
-          <a:p>
-            <a:r>
-              <a:rPr lang="en-GB" sz="1400" dirty="0">
-                <a:latin typeface="Corbel" panose="020B0503020204020204" pitchFamily="34" charset="0"/>
-              </a:rPr>
-              <a:t>When setting the time interval for particle number processes user must consider sensitivity of key system properties</a:t>
-            </a:r>
-          </a:p>
-        </p:txBody>
-      </p:sp>
-      <p:cxnSp>
-        <p:nvCxnSpPr>
-          <p:cNvPr id="100" name="Elbow Connector 99">
-            <a:extLst>
-              <a:ext uri="{FF2B5EF4-FFF2-40B4-BE49-F238E27FC236}">
-                <a16:creationId xmlns:a16="http://schemas.microsoft.com/office/drawing/2014/main" id="{D5E18C4D-87B0-0D40-9A8A-3B9A37B42A11}"/>
-              </a:ext>
-            </a:extLst>
-          </p:cNvPr>
-          <p:cNvCxnSpPr>
-            <a:cxnSpLocks/>
-          </p:cNvCxnSpPr>
-          <p:nvPr/>
-        </p:nvCxnSpPr>
-        <p:spPr>
-          <a:xfrm rot="5400000">
-            <a:off x="2955273" y="4030337"/>
-            <a:ext cx="898101" cy="838427"/>
-          </a:xfrm>
-          <a:prstGeom prst="bentConnector3">
-            <a:avLst>
-              <a:gd name="adj1" fmla="val 1820"/>
-            </a:avLst>
-          </a:prstGeom>
-          <a:ln w="28575">
-            <a:solidFill>
-              <a:schemeClr val="tx1"/>
-            </a:solidFill>
-            <a:tailEnd type="triangle"/>
-          </a:ln>
-        </p:spPr>
-        <p:style>
-          <a:lnRef idx="1">
-            <a:schemeClr val="accent1"/>
-          </a:lnRef>
-          <a:fillRef idx="0">
-            <a:schemeClr val="accent1"/>
-          </a:fillRef>
-          <a:effectRef idx="0">
-            <a:schemeClr val="accent1"/>
-          </a:effectRef>
-          <a:fontRef idx="minor">
-            <a:schemeClr val="tx1"/>
-          </a:fontRef>
-        </p:style>
-      </p:cxnSp>
+              <a:t>values due to change in chamber condition</a:t>
+            </a:r>
+          </a:p>
+        </p:txBody>
+      </p:sp>
     </p:spTree>
     <p:extLst>
       <p:ext uri="{BB962C8B-B14F-4D97-AF65-F5344CB8AC3E}">

</xml_diff>

<commit_message>
removed version numebrs from packages in macenv yml file
</commit_message>
<xml_diff>
--- a/PyCHAM/output/GMD_paper/Results/model_flow_diagram.pptx
+++ b/PyCHAM/output/GMD_paper/Results/model_flow_diagram.pptx
@@ -243,7 +243,7 @@
           <a:p>
             <a:fld id="{CD0ADA31-5820-614A-9D16-8F4F9317ADA4}" type="datetimeFigureOut">
               <a:rPr lang="en-GB" smtClean="0"/>
-              <a:t>09/07/2020</a:t>
+              <a:t>13/07/2020</a:t>
             </a:fld>
             <a:endParaRPr lang="en-GB"/>
           </a:p>
@@ -413,7 +413,7 @@
           <a:p>
             <a:fld id="{CD0ADA31-5820-614A-9D16-8F4F9317ADA4}" type="datetimeFigureOut">
               <a:rPr lang="en-GB" smtClean="0"/>
-              <a:t>09/07/2020</a:t>
+              <a:t>13/07/2020</a:t>
             </a:fld>
             <a:endParaRPr lang="en-GB"/>
           </a:p>
@@ -593,7 +593,7 @@
           <a:p>
             <a:fld id="{CD0ADA31-5820-614A-9D16-8F4F9317ADA4}" type="datetimeFigureOut">
               <a:rPr lang="en-GB" smtClean="0"/>
-              <a:t>09/07/2020</a:t>
+              <a:t>13/07/2020</a:t>
             </a:fld>
             <a:endParaRPr lang="en-GB"/>
           </a:p>
@@ -763,7 +763,7 @@
           <a:p>
             <a:fld id="{CD0ADA31-5820-614A-9D16-8F4F9317ADA4}" type="datetimeFigureOut">
               <a:rPr lang="en-GB" smtClean="0"/>
-              <a:t>09/07/2020</a:t>
+              <a:t>13/07/2020</a:t>
             </a:fld>
             <a:endParaRPr lang="en-GB"/>
           </a:p>
@@ -1007,7 +1007,7 @@
           <a:p>
             <a:fld id="{CD0ADA31-5820-614A-9D16-8F4F9317ADA4}" type="datetimeFigureOut">
               <a:rPr lang="en-GB" smtClean="0"/>
-              <a:t>09/07/2020</a:t>
+              <a:t>13/07/2020</a:t>
             </a:fld>
             <a:endParaRPr lang="en-GB"/>
           </a:p>
@@ -1239,7 +1239,7 @@
           <a:p>
             <a:fld id="{CD0ADA31-5820-614A-9D16-8F4F9317ADA4}" type="datetimeFigureOut">
               <a:rPr lang="en-GB" smtClean="0"/>
-              <a:t>09/07/2020</a:t>
+              <a:t>13/07/2020</a:t>
             </a:fld>
             <a:endParaRPr lang="en-GB"/>
           </a:p>
@@ -1606,7 +1606,7 @@
           <a:p>
             <a:fld id="{CD0ADA31-5820-614A-9D16-8F4F9317ADA4}" type="datetimeFigureOut">
               <a:rPr lang="en-GB" smtClean="0"/>
-              <a:t>09/07/2020</a:t>
+              <a:t>13/07/2020</a:t>
             </a:fld>
             <a:endParaRPr lang="en-GB"/>
           </a:p>
@@ -1724,7 +1724,7 @@
           <a:p>
             <a:fld id="{CD0ADA31-5820-614A-9D16-8F4F9317ADA4}" type="datetimeFigureOut">
               <a:rPr lang="en-GB" smtClean="0"/>
-              <a:t>09/07/2020</a:t>
+              <a:t>13/07/2020</a:t>
             </a:fld>
             <a:endParaRPr lang="en-GB"/>
           </a:p>
@@ -1819,7 +1819,7 @@
           <a:p>
             <a:fld id="{CD0ADA31-5820-614A-9D16-8F4F9317ADA4}" type="datetimeFigureOut">
               <a:rPr lang="en-GB" smtClean="0"/>
-              <a:t>09/07/2020</a:t>
+              <a:t>13/07/2020</a:t>
             </a:fld>
             <a:endParaRPr lang="en-GB"/>
           </a:p>
@@ -2096,7 +2096,7 @@
           <a:p>
             <a:fld id="{CD0ADA31-5820-614A-9D16-8F4F9317ADA4}" type="datetimeFigureOut">
               <a:rPr lang="en-GB" smtClean="0"/>
-              <a:t>09/07/2020</a:t>
+              <a:t>13/07/2020</a:t>
             </a:fld>
             <a:endParaRPr lang="en-GB"/>
           </a:p>
@@ -2353,7 +2353,7 @@
           <a:p>
             <a:fld id="{CD0ADA31-5820-614A-9D16-8F4F9317ADA4}" type="datetimeFigureOut">
               <a:rPr lang="en-GB" smtClean="0"/>
-              <a:t>09/07/2020</a:t>
+              <a:t>13/07/2020</a:t>
             </a:fld>
             <a:endParaRPr lang="en-GB"/>
           </a:p>
@@ -2566,7 +2566,7 @@
           <a:p>
             <a:fld id="{CD0ADA31-5820-614A-9D16-8F4F9317ADA4}" type="datetimeFigureOut">
               <a:rPr lang="en-GB" smtClean="0"/>
-              <a:t>09/07/2020</a:t>
+              <a:t>13/07/2020</a:t>
             </a:fld>
             <a:endParaRPr lang="en-GB"/>
           </a:p>
@@ -2983,10 +2983,10 @@
       </p:grpSpPr>
       <p:sp>
         <p:nvSpPr>
-          <p:cNvPr id="39" name="Rectangle 38">
+          <p:cNvPr id="41" name="Rectangle 40">
             <a:extLst>
               <a:ext uri="{FF2B5EF4-FFF2-40B4-BE49-F238E27FC236}">
-                <a16:creationId xmlns:a16="http://schemas.microsoft.com/office/drawing/2014/main" id="{7A85E68F-F9F1-CB43-89EE-BE85AEB782B2}"/>
+                <a16:creationId xmlns:a16="http://schemas.microsoft.com/office/drawing/2014/main" id="{613F0120-4956-D148-AC14-DC6220FD8B08}"/>
               </a:ext>
             </a:extLst>
           </p:cNvPr>
@@ -2995,14 +2995,14 @@
         </p:nvSpPr>
         <p:spPr>
           <a:xfrm>
-            <a:off x="7427495" y="613653"/>
-            <a:ext cx="994610" cy="307777"/>
+            <a:off x="6759510" y="1520217"/>
+            <a:ext cx="1550300" cy="262987"/>
           </a:xfrm>
           <a:prstGeom prst="rect">
             <a:avLst/>
           </a:prstGeom>
           <a:solidFill>
-            <a:srgbClr val="B7ED7D"/>
+            <a:srgbClr val="E3AEE7"/>
           </a:solidFill>
           <a:ln>
             <a:noFill/>
@@ -3035,6 +3035,107 @@
       </p:sp>
       <p:sp>
         <p:nvSpPr>
+          <p:cNvPr id="40" name="TextBox 39">
+            <a:extLst>
+              <a:ext uri="{FF2B5EF4-FFF2-40B4-BE49-F238E27FC236}">
+                <a16:creationId xmlns:a16="http://schemas.microsoft.com/office/drawing/2014/main" id="{BE3E5533-83BC-B343-987A-596D07FD7CDD}"/>
+              </a:ext>
+            </a:extLst>
+          </p:cNvPr>
+          <p:cNvSpPr txBox="1"/>
+          <p:nvPr/>
+        </p:nvSpPr>
+        <p:spPr>
+          <a:xfrm>
+            <a:off x="2519987" y="3741229"/>
+            <a:ext cx="1345362" cy="523220"/>
+          </a:xfrm>
+          <a:prstGeom prst="rect">
+            <a:avLst/>
+          </a:prstGeom>
+          <a:solidFill>
+            <a:srgbClr val="E3AEE7"/>
+          </a:solidFill>
+        </p:spPr>
+        <p:txBody>
+          <a:bodyPr wrap="square" rtlCol="0">
+            <a:spAutoFit/>
+          </a:bodyPr>
+          <a:lstStyle/>
+          <a:p>
+            <a:pPr algn="ctr"/>
+            <a:r>
+              <a:rPr lang="en-GB" sz="1400" dirty="0">
+                <a:latin typeface="Corbel" panose="020B0503020204020204" pitchFamily="34" charset="0"/>
+              </a:rPr>
+              <a:t>total simulation </a:t>
+            </a:r>
+          </a:p>
+          <a:p>
+            <a:pPr algn="ctr"/>
+            <a:r>
+              <a:rPr lang="en-GB" sz="1400" dirty="0">
+                <a:latin typeface="Corbel" panose="020B0503020204020204" pitchFamily="34" charset="0"/>
+              </a:rPr>
+              <a:t>time reached</a:t>
+            </a:r>
+          </a:p>
+        </p:txBody>
+      </p:sp>
+      <p:sp>
+        <p:nvSpPr>
+          <p:cNvPr id="39" name="Rectangle 38">
+            <a:extLst>
+              <a:ext uri="{FF2B5EF4-FFF2-40B4-BE49-F238E27FC236}">
+                <a16:creationId xmlns:a16="http://schemas.microsoft.com/office/drawing/2014/main" id="{7A85E68F-F9F1-CB43-89EE-BE85AEB782B2}"/>
+              </a:ext>
+            </a:extLst>
+          </p:cNvPr>
+          <p:cNvSpPr/>
+          <p:nvPr/>
+        </p:nvSpPr>
+        <p:spPr>
+          <a:xfrm>
+            <a:off x="6737686" y="1072861"/>
+            <a:ext cx="1876928" cy="240267"/>
+          </a:xfrm>
+          <a:prstGeom prst="rect">
+            <a:avLst/>
+          </a:prstGeom>
+          <a:solidFill>
+            <a:srgbClr val="B7ED7D"/>
+          </a:solidFill>
+          <a:ln>
+            <a:noFill/>
+          </a:ln>
+        </p:spPr>
+        <p:style>
+          <a:lnRef idx="2">
+            <a:schemeClr val="accent1">
+              <a:shade val="50000"/>
+            </a:schemeClr>
+          </a:lnRef>
+          <a:fillRef idx="1">
+            <a:schemeClr val="accent1"/>
+          </a:fillRef>
+          <a:effectRef idx="0">
+            <a:schemeClr val="accent1"/>
+          </a:effectRef>
+          <a:fontRef idx="minor">
+            <a:schemeClr val="lt1"/>
+          </a:fontRef>
+        </p:style>
+        <p:txBody>
+          <a:bodyPr rtlCol="0" anchor="ctr"/>
+          <a:lstStyle/>
+          <a:p>
+            <a:pPr algn="ctr"/>
+            <a:endParaRPr lang="en-GB"/>
+          </a:p>
+        </p:txBody>
+      </p:sp>
+      <p:sp>
+        <p:nvSpPr>
           <p:cNvPr id="4" name="TextBox 3">
             <a:extLst>
               <a:ext uri="{FF2B5EF4-FFF2-40B4-BE49-F238E27FC236}">
@@ -3181,7 +3282,7 @@
         </p:nvSpPr>
         <p:spPr>
           <a:xfrm>
-            <a:off x="4383040" y="3491293"/>
+            <a:off x="4383040" y="3250663"/>
             <a:ext cx="2163842" cy="954107"/>
           </a:xfrm>
           <a:prstGeom prst="rect">
@@ -3250,8 +3351,8 @@
         </p:nvSpPr>
         <p:spPr>
           <a:xfrm>
-            <a:off x="4401855" y="4640327"/>
-            <a:ext cx="2145027" cy="738664"/>
+            <a:off x="4401855" y="4511991"/>
+            <a:ext cx="2145027" cy="954107"/>
           </a:xfrm>
           <a:prstGeom prst="rect">
             <a:avLst/>
@@ -3276,7 +3377,15 @@
               <a:rPr lang="en-GB" sz="1400" dirty="0">
                 <a:latin typeface="Corbel" panose="020B0503020204020204" pitchFamily="34" charset="0"/>
               </a:rPr>
-              <a:t>iii. Coagulation</a:t>
+              <a:t>iii. Solution of:</a:t>
+            </a:r>
+          </a:p>
+          <a:p>
+            <a:r>
+              <a:rPr lang="en-GB" sz="1400" dirty="0">
+                <a:latin typeface="Corbel" panose="020B0503020204020204" pitchFamily="34" charset="0"/>
+              </a:rPr>
+              <a:t>Coagulation</a:t>
             </a:r>
           </a:p>
           <a:p>
@@ -4017,13 +4126,12 @@
           </p:cNvPr>
           <p:cNvCxnSpPr>
             <a:cxnSpLocks/>
-            <a:endCxn id="5" idx="0"/>
           </p:cNvCxnSpPr>
           <p:nvPr/>
         </p:nvCxnSpPr>
         <p:spPr>
           <a:xfrm>
-            <a:off x="2687605" y="1643081"/>
+            <a:off x="2671563" y="1643081"/>
             <a:ext cx="0" cy="703425"/>
           </a:xfrm>
           <a:prstGeom prst="line">
@@ -4289,7 +4397,7 @@
         <p:spPr>
           <a:xfrm>
             <a:off x="6675812" y="613653"/>
-            <a:ext cx="2468188" cy="1384995"/>
+            <a:ext cx="2468188" cy="1169551"/>
           </a:xfrm>
           <a:prstGeom prst="rect">
             <a:avLst/>
@@ -4309,7 +4417,15 @@
               <a:rPr lang="en-GB" sz="1400" dirty="0">
                 <a:latin typeface="Corbel" panose="020B0503020204020204" pitchFamily="34" charset="0"/>
               </a:rPr>
-              <a:t>User sets time interval for updates to constants (particle number concentration and natural light intensity (where applicable)) in the model variables file</a:t>
+              <a:t>In  the model variables file user sets the </a:t>
+            </a:r>
+          </a:p>
+          <a:p>
+            <a:r>
+              <a:rPr lang="en-GB" sz="1400" dirty="0">
+                <a:latin typeface="Corbel" panose="020B0503020204020204" pitchFamily="34" charset="0"/>
+              </a:rPr>
+              <a:t>time interval for updates to integration constants  and total simulation time</a:t>
             </a:r>
           </a:p>
         </p:txBody>
@@ -4465,7 +4581,7 @@
         </p:nvSpPr>
         <p:spPr>
           <a:xfrm>
-            <a:off x="6705557" y="2252866"/>
+            <a:off x="6705557" y="2317034"/>
             <a:ext cx="2454484" cy="954107"/>
           </a:xfrm>
           <a:prstGeom prst="rect">
@@ -4628,8 +4744,8 @@
         </p:nvSpPr>
         <p:spPr>
           <a:xfrm>
-            <a:off x="4359471" y="2371430"/>
-            <a:ext cx="2187411" cy="954107"/>
+            <a:off x="4359471" y="2403514"/>
+            <a:ext cx="2187411" cy="523220"/>
           </a:xfrm>
           <a:prstGeom prst="rect">
             <a:avLst/>
@@ -4660,19 +4776,7 @@
               <a:rPr lang="en-GB" sz="1400" dirty="0">
                 <a:latin typeface="Corbel" panose="020B0503020204020204" pitchFamily="34" charset="0"/>
               </a:rPr>
-              <a:t>. Updates to integration constants </a:t>
-            </a:r>
-            <a:r>
-              <a:rPr lang="en-GB" sz="1400">
-                <a:latin typeface="Corbel" panose="020B0503020204020204" pitchFamily="34" charset="0"/>
-              </a:rPr>
-              <a:t>and initial </a:t>
-            </a:r>
-            <a:r>
-              <a:rPr lang="en-GB" sz="1400" dirty="0">
-                <a:latin typeface="Corbel" panose="020B0503020204020204" pitchFamily="34" charset="0"/>
-              </a:rPr>
-              <a:t>values due to change in chamber condition</a:t>
+              <a:t>. Updates to integration constants and initial values</a:t>
             </a:r>
           </a:p>
         </p:txBody>

</xml_diff>